<commit_message>
北京：2023-01-21 23:09:33 纽约：2023-01-21 10:09:33 加州：2023-01-21 07:09:33 伦敦：2023-01-21 15:09:33 瑞士：2023-01-21 16:09:33 悉尼：2023-01-22 02:09:33
</commit_message>
<xml_diff>
--- a/self-info/Teacher LM.pptx
+++ b/self-info/Teacher LM.pptx
@@ -252,7 +252,7 @@
           <a:p>
             <a:fld id="{ECC6E495-074D-4A49-A062-D8E5D467D02D}" type="datetimeFigureOut">
               <a:rPr lang="en-US" smtClean="0"/>
-              <a:t>1/10/23</a:t>
+              <a:t>1/11/23</a:t>
             </a:fld>
             <a:endParaRPr lang="en-US"/>
           </a:p>
@@ -417,7 +417,7 @@
           <a:p>
             <a:fld id="{00F24AD7-4E24-49EC-8378-ED00CCEB1ED7}" type="datetimeFigureOut">
               <a:rPr lang="zh-CN" altLang="en-US" smtClean="0"/>
-              <a:t>2023/1/10</a:t>
+              <a:t>2023/1/11</a:t>
             </a:fld>
             <a:endParaRPr lang="zh-CN" altLang="en-US"/>
           </a:p>
@@ -1839,14 +1839,14 @@
           <a:effectLst/>
           <a:extLst>
             <a:ext uri="{909E8E84-426E-40dd-AFC4-6F175D3DCCD1}">
-              <a14:hiddenFill xmlns:a14="http://schemas.microsoft.com/office/drawing/2010/main" xmlns="">
+              <a14:hiddenFill xmlns="" xmlns:a14="http://schemas.microsoft.com/office/drawing/2010/main">
                 <a:solidFill>
                   <a:schemeClr val="accent1"/>
                 </a:solidFill>
               </a14:hiddenFill>
             </a:ext>
             <a:ext uri="{91240B29-F687-4f45-9708-019B960494DF}">
-              <a14:hiddenLine xmlns:a14="http://schemas.microsoft.com/office/drawing/2010/main" xmlns="" w="9525">
+              <a14:hiddenLine xmlns="" xmlns:a14="http://schemas.microsoft.com/office/drawing/2010/main" w="9525">
                 <a:solidFill>
                   <a:schemeClr val="tx1"/>
                 </a:solidFill>
@@ -1856,7 +1856,7 @@
               </a14:hiddenLine>
             </a:ext>
             <a:ext uri="{AF507438-7753-43e0-B8FC-AC1667EBCBE1}">
-              <a14:hiddenEffects xmlns:a14="http://schemas.microsoft.com/office/drawing/2010/main" xmlns="">
+              <a14:hiddenEffects xmlns="" xmlns:a14="http://schemas.microsoft.com/office/drawing/2010/main">
                 <a:effectLst>
                   <a:outerShdw dist="35921" dir="2700000" algn="ctr" rotWithShape="0">
                     <a:schemeClr val="bg2"/>
@@ -1903,14 +1903,14 @@
           <a:effectLst/>
           <a:extLst>
             <a:ext uri="{909E8E84-426E-40dd-AFC4-6F175D3DCCD1}">
-              <a14:hiddenFill xmlns:a14="http://schemas.microsoft.com/office/drawing/2010/main" xmlns="">
+              <a14:hiddenFill xmlns="" xmlns:a14="http://schemas.microsoft.com/office/drawing/2010/main">
                 <a:solidFill>
                   <a:schemeClr val="accent1"/>
                 </a:solidFill>
               </a14:hiddenFill>
             </a:ext>
             <a:ext uri="{91240B29-F687-4f45-9708-019B960494DF}">
-              <a14:hiddenLine xmlns:a14="http://schemas.microsoft.com/office/drawing/2010/main" xmlns="" w="9525">
+              <a14:hiddenLine xmlns="" xmlns:a14="http://schemas.microsoft.com/office/drawing/2010/main" w="9525">
                 <a:solidFill>
                   <a:schemeClr val="tx1"/>
                 </a:solidFill>
@@ -1920,7 +1920,7 @@
               </a14:hiddenLine>
             </a:ext>
             <a:ext uri="{AF507438-7753-43e0-B8FC-AC1667EBCBE1}">
-              <a14:hiddenEffects xmlns:a14="http://schemas.microsoft.com/office/drawing/2010/main" xmlns="">
+              <a14:hiddenEffects xmlns="" xmlns:a14="http://schemas.microsoft.com/office/drawing/2010/main">
                 <a:effectLst>
                   <a:outerShdw dist="35921" dir="2700000" algn="ctr" rotWithShape="0">
                     <a:schemeClr val="bg2"/>
@@ -2433,14 +2433,14 @@
           <a:effectLst/>
           <a:extLst>
             <a:ext uri="{909E8E84-426E-40dd-AFC4-6F175D3DCCD1}">
-              <a14:hiddenFill xmlns:a14="http://schemas.microsoft.com/office/drawing/2010/main" xmlns="">
+              <a14:hiddenFill xmlns="" xmlns:a14="http://schemas.microsoft.com/office/drawing/2010/main">
                 <a:solidFill>
                   <a:schemeClr val="accent1"/>
                 </a:solidFill>
               </a14:hiddenFill>
             </a:ext>
             <a:ext uri="{91240B29-F687-4f45-9708-019B960494DF}">
-              <a14:hiddenLine xmlns:a14="http://schemas.microsoft.com/office/drawing/2010/main" xmlns="" w="9525">
+              <a14:hiddenLine xmlns="" xmlns:a14="http://schemas.microsoft.com/office/drawing/2010/main" w="9525">
                 <a:solidFill>
                   <a:schemeClr val="tx1"/>
                 </a:solidFill>
@@ -2450,7 +2450,7 @@
               </a14:hiddenLine>
             </a:ext>
             <a:ext uri="{AF507438-7753-43e0-B8FC-AC1667EBCBE1}">
-              <a14:hiddenEffects xmlns:a14="http://schemas.microsoft.com/office/drawing/2010/main" xmlns="">
+              <a14:hiddenEffects xmlns="" xmlns:a14="http://schemas.microsoft.com/office/drawing/2010/main">
                 <a:effectLst>
                   <a:outerShdw dist="35921" dir="2700000" algn="ctr" rotWithShape="0">
                     <a:schemeClr val="bg2"/>
@@ -2505,12 +2505,12 @@
             <a:effectLst/>
             <a:extLst>
               <a:ext uri="{909E8E84-426E-40dd-AFC4-6F175D3DCCD1}">
-                <a14:hiddenFill xmlns:a14="http://schemas.microsoft.com/office/drawing/2010/main" xmlns="">
+                <a14:hiddenFill xmlns="" xmlns:a14="http://schemas.microsoft.com/office/drawing/2010/main">
                   <a:noFill/>
                 </a14:hiddenFill>
               </a:ext>
               <a:ext uri="{AF507438-7753-43e0-B8FC-AC1667EBCBE1}">
-                <a14:hiddenEffects xmlns:a14="http://schemas.microsoft.com/office/drawing/2010/main" xmlns="">
+                <a14:hiddenEffects xmlns="" xmlns:a14="http://schemas.microsoft.com/office/drawing/2010/main">
                   <a:effectLst>
                     <a:outerShdw dist="35921" dir="2700000" algn="ctr" rotWithShape="0">
                       <a:schemeClr val="bg2"/>
@@ -2556,12 +2556,12 @@
             <a:effectLst/>
             <a:extLst>
               <a:ext uri="{909E8E84-426E-40dd-AFC4-6F175D3DCCD1}">
-                <a14:hiddenFill xmlns:a14="http://schemas.microsoft.com/office/drawing/2010/main" xmlns="">
+                <a14:hiddenFill xmlns="" xmlns:a14="http://schemas.microsoft.com/office/drawing/2010/main">
                   <a:noFill/>
                 </a14:hiddenFill>
               </a:ext>
               <a:ext uri="{AF507438-7753-43e0-B8FC-AC1667EBCBE1}">
-                <a14:hiddenEffects xmlns:a14="http://schemas.microsoft.com/office/drawing/2010/main" xmlns="">
+                <a14:hiddenEffects xmlns="" xmlns:a14="http://schemas.microsoft.com/office/drawing/2010/main">
                   <a:effectLst>
                     <a:outerShdw dist="35921" dir="2700000" algn="ctr" rotWithShape="0">
                       <a:schemeClr val="bg2"/>
@@ -2607,12 +2607,12 @@
             <a:effectLst/>
             <a:extLst>
               <a:ext uri="{909E8E84-426E-40dd-AFC4-6F175D3DCCD1}">
-                <a14:hiddenFill xmlns:a14="http://schemas.microsoft.com/office/drawing/2010/main" xmlns="">
+                <a14:hiddenFill xmlns="" xmlns:a14="http://schemas.microsoft.com/office/drawing/2010/main">
                   <a:noFill/>
                 </a14:hiddenFill>
               </a:ext>
               <a:ext uri="{AF507438-7753-43e0-B8FC-AC1667EBCBE1}">
-                <a14:hiddenEffects xmlns:a14="http://schemas.microsoft.com/office/drawing/2010/main" xmlns="">
+                <a14:hiddenEffects xmlns="" xmlns:a14="http://schemas.microsoft.com/office/drawing/2010/main">
                   <a:effectLst>
                     <a:outerShdw dist="35921" dir="2700000" algn="ctr" rotWithShape="0">
                       <a:schemeClr val="bg2"/>
@@ -2658,12 +2658,12 @@
             <a:effectLst/>
             <a:extLst>
               <a:ext uri="{909E8E84-426E-40dd-AFC4-6F175D3DCCD1}">
-                <a14:hiddenFill xmlns:a14="http://schemas.microsoft.com/office/drawing/2010/main" xmlns="">
+                <a14:hiddenFill xmlns="" xmlns:a14="http://schemas.microsoft.com/office/drawing/2010/main">
                   <a:noFill/>
                 </a14:hiddenFill>
               </a:ext>
               <a:ext uri="{AF507438-7753-43e0-B8FC-AC1667EBCBE1}">
-                <a14:hiddenEffects xmlns:a14="http://schemas.microsoft.com/office/drawing/2010/main" xmlns="">
+                <a14:hiddenEffects xmlns="" xmlns:a14="http://schemas.microsoft.com/office/drawing/2010/main">
                   <a:effectLst>
                     <a:outerShdw dist="35921" dir="2700000" algn="ctr" rotWithShape="0">
                       <a:schemeClr val="bg2"/>
@@ -2775,14 +2775,14 @@
               <a:effectLst/>
               <a:extLst>
                 <a:ext uri="{909E8E84-426E-40dd-AFC4-6F175D3DCCD1}">
-                  <a14:hiddenFill xmlns:a14="http://schemas.microsoft.com/office/drawing/2010/main" xmlns="">
+                  <a14:hiddenFill xmlns="" xmlns:a14="http://schemas.microsoft.com/office/drawing/2010/main">
                     <a:solidFill>
                       <a:srgbClr val="FFFF00"/>
                     </a:solidFill>
                   </a14:hiddenFill>
                 </a:ext>
                 <a:ext uri="{AF507438-7753-43e0-B8FC-AC1667EBCBE1}">
-                  <a14:hiddenEffects xmlns:a14="http://schemas.microsoft.com/office/drawing/2010/main" xmlns="">
+                  <a14:hiddenEffects xmlns="" xmlns:a14="http://schemas.microsoft.com/office/drawing/2010/main">
                     <a:effectLst>
                       <a:outerShdw dist="35921" dir="2700000" algn="ctr" rotWithShape="0">
                         <a:schemeClr val="bg2"/>
@@ -2878,14 +2878,14 @@
               <a:effectLst/>
               <a:extLst>
                 <a:ext uri="{909E8E84-426E-40dd-AFC4-6F175D3DCCD1}">
-                  <a14:hiddenFill xmlns:a14="http://schemas.microsoft.com/office/drawing/2010/main" xmlns="">
+                  <a14:hiddenFill xmlns="" xmlns:a14="http://schemas.microsoft.com/office/drawing/2010/main">
                     <a:solidFill>
                       <a:srgbClr val="FFFF00"/>
                     </a:solidFill>
                   </a14:hiddenFill>
                 </a:ext>
                 <a:ext uri="{AF507438-7753-43e0-B8FC-AC1667EBCBE1}">
-                  <a14:hiddenEffects xmlns:a14="http://schemas.microsoft.com/office/drawing/2010/main" xmlns="">
+                  <a14:hiddenEffects xmlns="" xmlns:a14="http://schemas.microsoft.com/office/drawing/2010/main">
                     <a:effectLst>
                       <a:outerShdw dist="35921" dir="2700000" algn="ctr" rotWithShape="0">
                         <a:schemeClr val="bg2"/>
@@ -2932,12 +2932,12 @@
             <a:effectLst/>
             <a:extLst>
               <a:ext uri="{909E8E84-426E-40dd-AFC4-6F175D3DCCD1}">
-                <a14:hiddenFill xmlns:a14="http://schemas.microsoft.com/office/drawing/2010/main" xmlns="">
+                <a14:hiddenFill xmlns="" xmlns:a14="http://schemas.microsoft.com/office/drawing/2010/main">
                   <a:noFill/>
                 </a14:hiddenFill>
               </a:ext>
               <a:ext uri="{AF507438-7753-43e0-B8FC-AC1667EBCBE1}">
-                <a14:hiddenEffects xmlns:a14="http://schemas.microsoft.com/office/drawing/2010/main" xmlns="">
+                <a14:hiddenEffects xmlns="" xmlns:a14="http://schemas.microsoft.com/office/drawing/2010/main">
                   <a:effectLst>
                     <a:outerShdw dist="35921" dir="2700000" algn="ctr" rotWithShape="0">
                       <a:schemeClr val="bg2"/>
@@ -2983,12 +2983,12 @@
             <a:effectLst/>
             <a:extLst>
               <a:ext uri="{909E8E84-426E-40dd-AFC4-6F175D3DCCD1}">
-                <a14:hiddenFill xmlns:a14="http://schemas.microsoft.com/office/drawing/2010/main" xmlns="">
+                <a14:hiddenFill xmlns="" xmlns:a14="http://schemas.microsoft.com/office/drawing/2010/main">
                   <a:noFill/>
                 </a14:hiddenFill>
               </a:ext>
               <a:ext uri="{AF507438-7753-43e0-B8FC-AC1667EBCBE1}">
-                <a14:hiddenEffects xmlns:a14="http://schemas.microsoft.com/office/drawing/2010/main" xmlns="">
+                <a14:hiddenEffects xmlns="" xmlns:a14="http://schemas.microsoft.com/office/drawing/2010/main">
                   <a:effectLst>
                     <a:outerShdw dist="35921" dir="2700000" algn="ctr" rotWithShape="0">
                       <a:schemeClr val="bg2"/>
@@ -3034,12 +3034,12 @@
             <a:effectLst/>
             <a:extLst>
               <a:ext uri="{909E8E84-426E-40dd-AFC4-6F175D3DCCD1}">
-                <a14:hiddenFill xmlns:a14="http://schemas.microsoft.com/office/drawing/2010/main" xmlns="">
+                <a14:hiddenFill xmlns="" xmlns:a14="http://schemas.microsoft.com/office/drawing/2010/main">
                   <a:noFill/>
                 </a14:hiddenFill>
               </a:ext>
               <a:ext uri="{AF507438-7753-43e0-B8FC-AC1667EBCBE1}">
-                <a14:hiddenEffects xmlns:a14="http://schemas.microsoft.com/office/drawing/2010/main" xmlns="">
+                <a14:hiddenEffects xmlns="" xmlns:a14="http://schemas.microsoft.com/office/drawing/2010/main">
                   <a:effectLst>
                     <a:outerShdw dist="35921" dir="2700000" algn="ctr" rotWithShape="0">
                       <a:schemeClr val="bg2"/>
@@ -3085,12 +3085,12 @@
             <a:effectLst/>
             <a:extLst>
               <a:ext uri="{909E8E84-426E-40dd-AFC4-6F175D3DCCD1}">
-                <a14:hiddenFill xmlns:a14="http://schemas.microsoft.com/office/drawing/2010/main" xmlns="">
+                <a14:hiddenFill xmlns="" xmlns:a14="http://schemas.microsoft.com/office/drawing/2010/main">
                   <a:noFill/>
                 </a14:hiddenFill>
               </a:ext>
               <a:ext uri="{AF507438-7753-43e0-B8FC-AC1667EBCBE1}">
-                <a14:hiddenEffects xmlns:a14="http://schemas.microsoft.com/office/drawing/2010/main" xmlns="">
+                <a14:hiddenEffects xmlns="" xmlns:a14="http://schemas.microsoft.com/office/drawing/2010/main">
                   <a:effectLst>
                     <a:outerShdw dist="35921" dir="2700000" algn="ctr" rotWithShape="0">
                       <a:schemeClr val="bg2"/>
@@ -3136,12 +3136,12 @@
             <a:effectLst/>
             <a:extLst>
               <a:ext uri="{909E8E84-426E-40dd-AFC4-6F175D3DCCD1}">
-                <a14:hiddenFill xmlns:a14="http://schemas.microsoft.com/office/drawing/2010/main" xmlns="">
+                <a14:hiddenFill xmlns="" xmlns:a14="http://schemas.microsoft.com/office/drawing/2010/main">
                   <a:noFill/>
                 </a14:hiddenFill>
               </a:ext>
               <a:ext uri="{AF507438-7753-43e0-B8FC-AC1667EBCBE1}">
-                <a14:hiddenEffects xmlns:a14="http://schemas.microsoft.com/office/drawing/2010/main" xmlns="">
+                <a14:hiddenEffects xmlns="" xmlns:a14="http://schemas.microsoft.com/office/drawing/2010/main">
                   <a:effectLst>
                     <a:outerShdw dist="35921" dir="2700000" algn="ctr" rotWithShape="0">
                       <a:schemeClr val="bg2"/>
@@ -3187,12 +3187,12 @@
             <a:effectLst/>
             <a:extLst>
               <a:ext uri="{909E8E84-426E-40dd-AFC4-6F175D3DCCD1}">
-                <a14:hiddenFill xmlns:a14="http://schemas.microsoft.com/office/drawing/2010/main" xmlns="">
+                <a14:hiddenFill xmlns="" xmlns:a14="http://schemas.microsoft.com/office/drawing/2010/main">
                   <a:noFill/>
                 </a14:hiddenFill>
               </a:ext>
               <a:ext uri="{AF507438-7753-43e0-B8FC-AC1667EBCBE1}">
-                <a14:hiddenEffects xmlns:a14="http://schemas.microsoft.com/office/drawing/2010/main" xmlns="">
+                <a14:hiddenEffects xmlns="" xmlns:a14="http://schemas.microsoft.com/office/drawing/2010/main">
                   <a:effectLst>
                     <a:outerShdw dist="35921" dir="2700000" algn="ctr" rotWithShape="0">
                       <a:schemeClr val="bg2"/>
@@ -3238,12 +3238,12 @@
             <a:effectLst/>
             <a:extLst>
               <a:ext uri="{909E8E84-426E-40dd-AFC4-6F175D3DCCD1}">
-                <a14:hiddenFill xmlns:a14="http://schemas.microsoft.com/office/drawing/2010/main" xmlns="">
+                <a14:hiddenFill xmlns="" xmlns:a14="http://schemas.microsoft.com/office/drawing/2010/main">
                   <a:noFill/>
                 </a14:hiddenFill>
               </a:ext>
               <a:ext uri="{AF507438-7753-43e0-B8FC-AC1667EBCBE1}">
-                <a14:hiddenEffects xmlns:a14="http://schemas.microsoft.com/office/drawing/2010/main" xmlns="">
+                <a14:hiddenEffects xmlns="" xmlns:a14="http://schemas.microsoft.com/office/drawing/2010/main">
                   <a:effectLst>
                     <a:outerShdw dist="35921" dir="2700000" algn="ctr" rotWithShape="0">
                       <a:schemeClr val="bg2"/>
@@ -3289,12 +3289,12 @@
             <a:effectLst/>
             <a:extLst>
               <a:ext uri="{909E8E84-426E-40dd-AFC4-6F175D3DCCD1}">
-                <a14:hiddenFill xmlns:a14="http://schemas.microsoft.com/office/drawing/2010/main" xmlns="">
+                <a14:hiddenFill xmlns="" xmlns:a14="http://schemas.microsoft.com/office/drawing/2010/main">
                   <a:noFill/>
                 </a14:hiddenFill>
               </a:ext>
               <a:ext uri="{AF507438-7753-43e0-B8FC-AC1667EBCBE1}">
-                <a14:hiddenEffects xmlns:a14="http://schemas.microsoft.com/office/drawing/2010/main" xmlns="">
+                <a14:hiddenEffects xmlns="" xmlns:a14="http://schemas.microsoft.com/office/drawing/2010/main">
                   <a:effectLst>
                     <a:outerShdw dist="35921" dir="2700000" algn="ctr" rotWithShape="0">
                       <a:schemeClr val="bg2"/>
@@ -3340,12 +3340,12 @@
             <a:effectLst/>
             <a:extLst>
               <a:ext uri="{909E8E84-426E-40dd-AFC4-6F175D3DCCD1}">
-                <a14:hiddenFill xmlns:a14="http://schemas.microsoft.com/office/drawing/2010/main" xmlns="">
+                <a14:hiddenFill xmlns="" xmlns:a14="http://schemas.microsoft.com/office/drawing/2010/main">
                   <a:noFill/>
                 </a14:hiddenFill>
               </a:ext>
               <a:ext uri="{AF507438-7753-43e0-B8FC-AC1667EBCBE1}">
-                <a14:hiddenEffects xmlns:a14="http://schemas.microsoft.com/office/drawing/2010/main" xmlns="">
+                <a14:hiddenEffects xmlns="" xmlns:a14="http://schemas.microsoft.com/office/drawing/2010/main">
                   <a:effectLst>
                     <a:outerShdw dist="35921" dir="2700000" algn="ctr" rotWithShape="0">
                       <a:schemeClr val="bg2"/>
@@ -3391,12 +3391,12 @@
             <a:effectLst/>
             <a:extLst>
               <a:ext uri="{909E8E84-426E-40dd-AFC4-6F175D3DCCD1}">
-                <a14:hiddenFill xmlns:a14="http://schemas.microsoft.com/office/drawing/2010/main" xmlns="">
+                <a14:hiddenFill xmlns="" xmlns:a14="http://schemas.microsoft.com/office/drawing/2010/main">
                   <a:noFill/>
                 </a14:hiddenFill>
               </a:ext>
               <a:ext uri="{AF507438-7753-43e0-B8FC-AC1667EBCBE1}">
-                <a14:hiddenEffects xmlns:a14="http://schemas.microsoft.com/office/drawing/2010/main" xmlns="">
+                <a14:hiddenEffects xmlns="" xmlns:a14="http://schemas.microsoft.com/office/drawing/2010/main">
                   <a:effectLst>
                     <a:outerShdw dist="35921" dir="2700000" algn="ctr" rotWithShape="0">
                       <a:schemeClr val="bg2"/>
@@ -3442,12 +3442,12 @@
             <a:effectLst/>
             <a:extLst>
               <a:ext uri="{909E8E84-426E-40dd-AFC4-6F175D3DCCD1}">
-                <a14:hiddenFill xmlns:a14="http://schemas.microsoft.com/office/drawing/2010/main" xmlns="">
+                <a14:hiddenFill xmlns="" xmlns:a14="http://schemas.microsoft.com/office/drawing/2010/main">
                   <a:noFill/>
                 </a14:hiddenFill>
               </a:ext>
               <a:ext uri="{AF507438-7753-43e0-B8FC-AC1667EBCBE1}">
-                <a14:hiddenEffects xmlns:a14="http://schemas.microsoft.com/office/drawing/2010/main" xmlns="">
+                <a14:hiddenEffects xmlns="" xmlns:a14="http://schemas.microsoft.com/office/drawing/2010/main">
                   <a:effectLst>
                     <a:outerShdw dist="35921" dir="2700000" algn="ctr" rotWithShape="0">
                       <a:schemeClr val="bg2"/>
@@ -3493,12 +3493,12 @@
             <a:effectLst/>
             <a:extLst>
               <a:ext uri="{909E8E84-426E-40dd-AFC4-6F175D3DCCD1}">
-                <a14:hiddenFill xmlns:a14="http://schemas.microsoft.com/office/drawing/2010/main" xmlns="">
+                <a14:hiddenFill xmlns="" xmlns:a14="http://schemas.microsoft.com/office/drawing/2010/main">
                   <a:noFill/>
                 </a14:hiddenFill>
               </a:ext>
               <a:ext uri="{AF507438-7753-43e0-B8FC-AC1667EBCBE1}">
-                <a14:hiddenEffects xmlns:a14="http://schemas.microsoft.com/office/drawing/2010/main" xmlns="">
+                <a14:hiddenEffects xmlns="" xmlns:a14="http://schemas.microsoft.com/office/drawing/2010/main">
                   <a:effectLst>
                     <a:outerShdw dist="35921" dir="2700000" algn="ctr" rotWithShape="0">
                       <a:schemeClr val="bg2"/>
@@ -3610,14 +3610,14 @@
               <a:effectLst/>
               <a:extLst>
                 <a:ext uri="{909E8E84-426E-40dd-AFC4-6F175D3DCCD1}">
-                  <a14:hiddenFill xmlns:a14="http://schemas.microsoft.com/office/drawing/2010/main" xmlns="">
+                  <a14:hiddenFill xmlns="" xmlns:a14="http://schemas.microsoft.com/office/drawing/2010/main">
                     <a:solidFill>
                       <a:srgbClr val="FFFF00"/>
                     </a:solidFill>
                   </a14:hiddenFill>
                 </a:ext>
                 <a:ext uri="{AF507438-7753-43e0-B8FC-AC1667EBCBE1}">
-                  <a14:hiddenEffects xmlns:a14="http://schemas.microsoft.com/office/drawing/2010/main" xmlns="">
+                  <a14:hiddenEffects xmlns="" xmlns:a14="http://schemas.microsoft.com/office/drawing/2010/main">
                     <a:effectLst>
                       <a:outerShdw dist="35921" dir="2700000" algn="ctr" rotWithShape="0">
                         <a:schemeClr val="bg2"/>
@@ -3713,14 +3713,14 @@
               <a:effectLst/>
               <a:extLst>
                 <a:ext uri="{909E8E84-426E-40dd-AFC4-6F175D3DCCD1}">
-                  <a14:hiddenFill xmlns:a14="http://schemas.microsoft.com/office/drawing/2010/main" xmlns="">
+                  <a14:hiddenFill xmlns="" xmlns:a14="http://schemas.microsoft.com/office/drawing/2010/main">
                     <a:solidFill>
                       <a:srgbClr val="FFFF00"/>
                     </a:solidFill>
                   </a14:hiddenFill>
                 </a:ext>
                 <a:ext uri="{AF507438-7753-43e0-B8FC-AC1667EBCBE1}">
-                  <a14:hiddenEffects xmlns:a14="http://schemas.microsoft.com/office/drawing/2010/main" xmlns="">
+                  <a14:hiddenEffects xmlns="" xmlns:a14="http://schemas.microsoft.com/office/drawing/2010/main">
                     <a:effectLst>
                       <a:outerShdw dist="35921" dir="2700000" algn="ctr" rotWithShape="0">
                         <a:schemeClr val="bg2"/>
@@ -3767,12 +3767,12 @@
             <a:effectLst/>
             <a:extLst>
               <a:ext uri="{909E8E84-426E-40dd-AFC4-6F175D3DCCD1}">
-                <a14:hiddenFill xmlns:a14="http://schemas.microsoft.com/office/drawing/2010/main" xmlns="">
+                <a14:hiddenFill xmlns="" xmlns:a14="http://schemas.microsoft.com/office/drawing/2010/main">
                   <a:noFill/>
                 </a14:hiddenFill>
               </a:ext>
               <a:ext uri="{AF507438-7753-43e0-B8FC-AC1667EBCBE1}">
-                <a14:hiddenEffects xmlns:a14="http://schemas.microsoft.com/office/drawing/2010/main" xmlns="">
+                <a14:hiddenEffects xmlns="" xmlns:a14="http://schemas.microsoft.com/office/drawing/2010/main">
                   <a:effectLst>
                     <a:outerShdw dist="35921" dir="2700000" algn="ctr" rotWithShape="0">
                       <a:schemeClr val="bg2"/>
@@ -3818,12 +3818,12 @@
             <a:effectLst/>
             <a:extLst>
               <a:ext uri="{909E8E84-426E-40dd-AFC4-6F175D3DCCD1}">
-                <a14:hiddenFill xmlns:a14="http://schemas.microsoft.com/office/drawing/2010/main" xmlns="">
+                <a14:hiddenFill xmlns="" xmlns:a14="http://schemas.microsoft.com/office/drawing/2010/main">
                   <a:noFill/>
                 </a14:hiddenFill>
               </a:ext>
               <a:ext uri="{AF507438-7753-43e0-B8FC-AC1667EBCBE1}">
-                <a14:hiddenEffects xmlns:a14="http://schemas.microsoft.com/office/drawing/2010/main" xmlns="">
+                <a14:hiddenEffects xmlns="" xmlns:a14="http://schemas.microsoft.com/office/drawing/2010/main">
                   <a:effectLst>
                     <a:outerShdw dist="35921" dir="2700000" algn="ctr" rotWithShape="0">
                       <a:schemeClr val="bg2"/>
@@ -3869,12 +3869,12 @@
             <a:effectLst/>
             <a:extLst>
               <a:ext uri="{909E8E84-426E-40dd-AFC4-6F175D3DCCD1}">
-                <a14:hiddenFill xmlns:a14="http://schemas.microsoft.com/office/drawing/2010/main" xmlns="">
+                <a14:hiddenFill xmlns="" xmlns:a14="http://schemas.microsoft.com/office/drawing/2010/main">
                   <a:noFill/>
                 </a14:hiddenFill>
               </a:ext>
               <a:ext uri="{AF507438-7753-43e0-B8FC-AC1667EBCBE1}">
-                <a14:hiddenEffects xmlns:a14="http://schemas.microsoft.com/office/drawing/2010/main" xmlns="">
+                <a14:hiddenEffects xmlns="" xmlns:a14="http://schemas.microsoft.com/office/drawing/2010/main">
                   <a:effectLst>
                     <a:outerShdw dist="35921" dir="2700000" algn="ctr" rotWithShape="0">
                       <a:schemeClr val="bg2"/>
@@ -3920,12 +3920,12 @@
             <a:effectLst/>
             <a:extLst>
               <a:ext uri="{909E8E84-426E-40dd-AFC4-6F175D3DCCD1}">
-                <a14:hiddenFill xmlns:a14="http://schemas.microsoft.com/office/drawing/2010/main" xmlns="">
+                <a14:hiddenFill xmlns="" xmlns:a14="http://schemas.microsoft.com/office/drawing/2010/main">
                   <a:noFill/>
                 </a14:hiddenFill>
               </a:ext>
               <a:ext uri="{AF507438-7753-43e0-B8FC-AC1667EBCBE1}">
-                <a14:hiddenEffects xmlns:a14="http://schemas.microsoft.com/office/drawing/2010/main" xmlns="">
+                <a14:hiddenEffects xmlns="" xmlns:a14="http://schemas.microsoft.com/office/drawing/2010/main">
                   <a:effectLst>
                     <a:outerShdw dist="35921" dir="2700000" algn="ctr" rotWithShape="0">
                       <a:schemeClr val="bg2"/>
@@ -3971,12 +3971,12 @@
             <a:effectLst/>
             <a:extLst>
               <a:ext uri="{909E8E84-426E-40dd-AFC4-6F175D3DCCD1}">
-                <a14:hiddenFill xmlns:a14="http://schemas.microsoft.com/office/drawing/2010/main" xmlns="">
+                <a14:hiddenFill xmlns="" xmlns:a14="http://schemas.microsoft.com/office/drawing/2010/main">
                   <a:noFill/>
                 </a14:hiddenFill>
               </a:ext>
               <a:ext uri="{AF507438-7753-43e0-B8FC-AC1667EBCBE1}">
-                <a14:hiddenEffects xmlns:a14="http://schemas.microsoft.com/office/drawing/2010/main" xmlns="">
+                <a14:hiddenEffects xmlns="" xmlns:a14="http://schemas.microsoft.com/office/drawing/2010/main">
                   <a:effectLst>
                     <a:outerShdw dist="35921" dir="2700000" algn="ctr" rotWithShape="0">
                       <a:schemeClr val="bg2"/>
@@ -4022,12 +4022,12 @@
             <a:effectLst/>
             <a:extLst>
               <a:ext uri="{909E8E84-426E-40dd-AFC4-6F175D3DCCD1}">
-                <a14:hiddenFill xmlns:a14="http://schemas.microsoft.com/office/drawing/2010/main" xmlns="">
+                <a14:hiddenFill xmlns="" xmlns:a14="http://schemas.microsoft.com/office/drawing/2010/main">
                   <a:noFill/>
                 </a14:hiddenFill>
               </a:ext>
               <a:ext uri="{AF507438-7753-43e0-B8FC-AC1667EBCBE1}">
-                <a14:hiddenEffects xmlns:a14="http://schemas.microsoft.com/office/drawing/2010/main" xmlns="">
+                <a14:hiddenEffects xmlns="" xmlns:a14="http://schemas.microsoft.com/office/drawing/2010/main">
                   <a:effectLst>
                     <a:outerShdw dist="35921" dir="2700000" algn="ctr" rotWithShape="0">
                       <a:schemeClr val="bg2"/>
@@ -4073,12 +4073,12 @@
             <a:effectLst/>
             <a:extLst>
               <a:ext uri="{909E8E84-426E-40dd-AFC4-6F175D3DCCD1}">
-                <a14:hiddenFill xmlns:a14="http://schemas.microsoft.com/office/drawing/2010/main" xmlns="">
+                <a14:hiddenFill xmlns="" xmlns:a14="http://schemas.microsoft.com/office/drawing/2010/main">
                   <a:noFill/>
                 </a14:hiddenFill>
               </a:ext>
               <a:ext uri="{AF507438-7753-43e0-B8FC-AC1667EBCBE1}">
-                <a14:hiddenEffects xmlns:a14="http://schemas.microsoft.com/office/drawing/2010/main" xmlns="">
+                <a14:hiddenEffects xmlns="" xmlns:a14="http://schemas.microsoft.com/office/drawing/2010/main">
                   <a:effectLst>
                     <a:outerShdw dist="35921" dir="2700000" algn="ctr" rotWithShape="0">
                       <a:schemeClr val="bg2"/>
@@ -4124,12 +4124,12 @@
             <a:effectLst/>
             <a:extLst>
               <a:ext uri="{909E8E84-426E-40dd-AFC4-6F175D3DCCD1}">
-                <a14:hiddenFill xmlns:a14="http://schemas.microsoft.com/office/drawing/2010/main" xmlns="">
+                <a14:hiddenFill xmlns="" xmlns:a14="http://schemas.microsoft.com/office/drawing/2010/main">
                   <a:noFill/>
                 </a14:hiddenFill>
               </a:ext>
               <a:ext uri="{AF507438-7753-43e0-B8FC-AC1667EBCBE1}">
-                <a14:hiddenEffects xmlns:a14="http://schemas.microsoft.com/office/drawing/2010/main" xmlns="">
+                <a14:hiddenEffects xmlns="" xmlns:a14="http://schemas.microsoft.com/office/drawing/2010/main">
                   <a:effectLst>
                     <a:outerShdw dist="35921" dir="2700000" algn="ctr" rotWithShape="0">
                       <a:schemeClr val="bg2"/>
@@ -4175,12 +4175,12 @@
             <a:effectLst/>
             <a:extLst>
               <a:ext uri="{909E8E84-426E-40dd-AFC4-6F175D3DCCD1}">
-                <a14:hiddenFill xmlns:a14="http://schemas.microsoft.com/office/drawing/2010/main" xmlns="">
+                <a14:hiddenFill xmlns="" xmlns:a14="http://schemas.microsoft.com/office/drawing/2010/main">
                   <a:noFill/>
                 </a14:hiddenFill>
               </a:ext>
               <a:ext uri="{AF507438-7753-43e0-B8FC-AC1667EBCBE1}">
-                <a14:hiddenEffects xmlns:a14="http://schemas.microsoft.com/office/drawing/2010/main" xmlns="">
+                <a14:hiddenEffects xmlns="" xmlns:a14="http://schemas.microsoft.com/office/drawing/2010/main">
                   <a:effectLst>
                     <a:outerShdw dist="35921" dir="2700000" algn="ctr" rotWithShape="0">
                       <a:schemeClr val="bg2"/>
@@ -4226,12 +4226,12 @@
             <a:effectLst/>
             <a:extLst>
               <a:ext uri="{909E8E84-426E-40dd-AFC4-6F175D3DCCD1}">
-                <a14:hiddenFill xmlns:a14="http://schemas.microsoft.com/office/drawing/2010/main" xmlns="">
+                <a14:hiddenFill xmlns="" xmlns:a14="http://schemas.microsoft.com/office/drawing/2010/main">
                   <a:noFill/>
                 </a14:hiddenFill>
               </a:ext>
               <a:ext uri="{AF507438-7753-43e0-B8FC-AC1667EBCBE1}">
-                <a14:hiddenEffects xmlns:a14="http://schemas.microsoft.com/office/drawing/2010/main" xmlns="">
+                <a14:hiddenEffects xmlns="" xmlns:a14="http://schemas.microsoft.com/office/drawing/2010/main">
                   <a:effectLst>
                     <a:outerShdw dist="35921" dir="2700000" algn="ctr" rotWithShape="0">
                       <a:schemeClr val="bg2"/>
@@ -4277,12 +4277,12 @@
             <a:effectLst/>
             <a:extLst>
               <a:ext uri="{909E8E84-426E-40dd-AFC4-6F175D3DCCD1}">
-                <a14:hiddenFill xmlns:a14="http://schemas.microsoft.com/office/drawing/2010/main" xmlns="">
+                <a14:hiddenFill xmlns="" xmlns:a14="http://schemas.microsoft.com/office/drawing/2010/main">
                   <a:noFill/>
                 </a14:hiddenFill>
               </a:ext>
               <a:ext uri="{AF507438-7753-43e0-B8FC-AC1667EBCBE1}">
-                <a14:hiddenEffects xmlns:a14="http://schemas.microsoft.com/office/drawing/2010/main" xmlns="">
+                <a14:hiddenEffects xmlns="" xmlns:a14="http://schemas.microsoft.com/office/drawing/2010/main">
                   <a:effectLst>
                     <a:outerShdw dist="35921" dir="2700000" algn="ctr" rotWithShape="0">
                       <a:schemeClr val="bg2"/>
@@ -4328,12 +4328,12 @@
             <a:effectLst/>
             <a:extLst>
               <a:ext uri="{909E8E84-426E-40dd-AFC4-6F175D3DCCD1}">
-                <a14:hiddenFill xmlns:a14="http://schemas.microsoft.com/office/drawing/2010/main" xmlns="">
+                <a14:hiddenFill xmlns="" xmlns:a14="http://schemas.microsoft.com/office/drawing/2010/main">
                   <a:noFill/>
                 </a14:hiddenFill>
               </a:ext>
               <a:ext uri="{AF507438-7753-43e0-B8FC-AC1667EBCBE1}">
-                <a14:hiddenEffects xmlns:a14="http://schemas.microsoft.com/office/drawing/2010/main" xmlns="">
+                <a14:hiddenEffects xmlns="" xmlns:a14="http://schemas.microsoft.com/office/drawing/2010/main">
                   <a:effectLst>
                     <a:outerShdw dist="35921" dir="2700000" algn="ctr" rotWithShape="0">
                       <a:schemeClr val="bg2"/>
@@ -4379,12 +4379,12 @@
             <a:effectLst/>
             <a:extLst>
               <a:ext uri="{909E8E84-426E-40dd-AFC4-6F175D3DCCD1}">
-                <a14:hiddenFill xmlns:a14="http://schemas.microsoft.com/office/drawing/2010/main" xmlns="">
+                <a14:hiddenFill xmlns="" xmlns:a14="http://schemas.microsoft.com/office/drawing/2010/main">
                   <a:noFill/>
                 </a14:hiddenFill>
               </a:ext>
               <a:ext uri="{AF507438-7753-43e0-B8FC-AC1667EBCBE1}">
-                <a14:hiddenEffects xmlns:a14="http://schemas.microsoft.com/office/drawing/2010/main" xmlns="">
+                <a14:hiddenEffects xmlns="" xmlns:a14="http://schemas.microsoft.com/office/drawing/2010/main">
                   <a:effectLst>
                     <a:outerShdw dist="35921" dir="2700000" algn="ctr" rotWithShape="0">
                       <a:schemeClr val="bg2"/>
@@ -4430,12 +4430,12 @@
             <a:effectLst/>
             <a:extLst>
               <a:ext uri="{909E8E84-426E-40dd-AFC4-6F175D3DCCD1}">
-                <a14:hiddenFill xmlns:a14="http://schemas.microsoft.com/office/drawing/2010/main" xmlns="">
+                <a14:hiddenFill xmlns="" xmlns:a14="http://schemas.microsoft.com/office/drawing/2010/main">
                   <a:noFill/>
                 </a14:hiddenFill>
               </a:ext>
               <a:ext uri="{AF507438-7753-43e0-B8FC-AC1667EBCBE1}">
-                <a14:hiddenEffects xmlns:a14="http://schemas.microsoft.com/office/drawing/2010/main" xmlns="">
+                <a14:hiddenEffects xmlns="" xmlns:a14="http://schemas.microsoft.com/office/drawing/2010/main">
                   <a:effectLst>
                     <a:outerShdw dist="35921" dir="2700000" algn="ctr" rotWithShape="0">
                       <a:schemeClr val="bg2"/>
@@ -4497,12 +4497,12 @@
               <a:effectLst/>
               <a:extLst>
                 <a:ext uri="{909E8E84-426E-40dd-AFC4-6F175D3DCCD1}">
-                  <a14:hiddenFill xmlns:a14="http://schemas.microsoft.com/office/drawing/2010/main" xmlns="">
+                  <a14:hiddenFill xmlns="" xmlns:a14="http://schemas.microsoft.com/office/drawing/2010/main">
                     <a:noFill/>
                   </a14:hiddenFill>
                 </a:ext>
                 <a:ext uri="{AF507438-7753-43e0-B8FC-AC1667EBCBE1}">
-                  <a14:hiddenEffects xmlns:a14="http://schemas.microsoft.com/office/drawing/2010/main" xmlns="">
+                  <a14:hiddenEffects xmlns="" xmlns:a14="http://schemas.microsoft.com/office/drawing/2010/main">
                     <a:effectLst>
                       <a:outerShdw dist="35921" dir="2700000" algn="ctr" rotWithShape="0">
                         <a:schemeClr val="bg2"/>
@@ -4548,12 +4548,12 @@
               <a:effectLst/>
               <a:extLst>
                 <a:ext uri="{909E8E84-426E-40dd-AFC4-6F175D3DCCD1}">
-                  <a14:hiddenFill xmlns:a14="http://schemas.microsoft.com/office/drawing/2010/main" xmlns="">
+                  <a14:hiddenFill xmlns="" xmlns:a14="http://schemas.microsoft.com/office/drawing/2010/main">
                     <a:noFill/>
                   </a14:hiddenFill>
                 </a:ext>
                 <a:ext uri="{AF507438-7753-43e0-B8FC-AC1667EBCBE1}">
-                  <a14:hiddenEffects xmlns:a14="http://schemas.microsoft.com/office/drawing/2010/main" xmlns="">
+                  <a14:hiddenEffects xmlns="" xmlns:a14="http://schemas.microsoft.com/office/drawing/2010/main">
                     <a:effectLst>
                       <a:outerShdw dist="35921" dir="2700000" algn="ctr" rotWithShape="0">
                         <a:schemeClr val="bg2"/>
@@ -4599,12 +4599,12 @@
               <a:effectLst/>
               <a:extLst>
                 <a:ext uri="{909E8E84-426E-40dd-AFC4-6F175D3DCCD1}">
-                  <a14:hiddenFill xmlns:a14="http://schemas.microsoft.com/office/drawing/2010/main" xmlns="">
+                  <a14:hiddenFill xmlns="" xmlns:a14="http://schemas.microsoft.com/office/drawing/2010/main">
                     <a:noFill/>
                   </a14:hiddenFill>
                 </a:ext>
                 <a:ext uri="{AF507438-7753-43e0-B8FC-AC1667EBCBE1}">
-                  <a14:hiddenEffects xmlns:a14="http://schemas.microsoft.com/office/drawing/2010/main" xmlns="">
+                  <a14:hiddenEffects xmlns="" xmlns:a14="http://schemas.microsoft.com/office/drawing/2010/main">
                     <a:effectLst>
                       <a:outerShdw dist="35921" dir="2700000" algn="ctr" rotWithShape="0">
                         <a:schemeClr val="bg2"/>
@@ -4650,12 +4650,12 @@
               <a:effectLst/>
               <a:extLst>
                 <a:ext uri="{909E8E84-426E-40dd-AFC4-6F175D3DCCD1}">
-                  <a14:hiddenFill xmlns:a14="http://schemas.microsoft.com/office/drawing/2010/main" xmlns="">
+                  <a14:hiddenFill xmlns="" xmlns:a14="http://schemas.microsoft.com/office/drawing/2010/main">
                     <a:noFill/>
                   </a14:hiddenFill>
                 </a:ext>
                 <a:ext uri="{AF507438-7753-43e0-B8FC-AC1667EBCBE1}">
-                  <a14:hiddenEffects xmlns:a14="http://schemas.microsoft.com/office/drawing/2010/main" xmlns="">
+                  <a14:hiddenEffects xmlns="" xmlns:a14="http://schemas.microsoft.com/office/drawing/2010/main">
                     <a:effectLst>
                       <a:outerShdw dist="35921" dir="2700000" algn="ctr" rotWithShape="0">
                         <a:schemeClr val="bg2"/>
@@ -4718,12 +4718,12 @@
               <a:effectLst/>
               <a:extLst>
                 <a:ext uri="{909E8E84-426E-40dd-AFC4-6F175D3DCCD1}">
-                  <a14:hiddenFill xmlns:a14="http://schemas.microsoft.com/office/drawing/2010/main" xmlns="">
+                  <a14:hiddenFill xmlns="" xmlns:a14="http://schemas.microsoft.com/office/drawing/2010/main">
                     <a:noFill/>
                   </a14:hiddenFill>
                 </a:ext>
                 <a:ext uri="{AF507438-7753-43e0-B8FC-AC1667EBCBE1}">
-                  <a14:hiddenEffects xmlns:a14="http://schemas.microsoft.com/office/drawing/2010/main" xmlns="">
+                  <a14:hiddenEffects xmlns="" xmlns:a14="http://schemas.microsoft.com/office/drawing/2010/main">
                     <a:effectLst>
                       <a:outerShdw dist="35921" dir="2700000" algn="ctr" rotWithShape="0">
                         <a:schemeClr val="bg2"/>
@@ -4769,12 +4769,12 @@
               <a:effectLst/>
               <a:extLst>
                 <a:ext uri="{909E8E84-426E-40dd-AFC4-6F175D3DCCD1}">
-                  <a14:hiddenFill xmlns:a14="http://schemas.microsoft.com/office/drawing/2010/main" xmlns="">
+                  <a14:hiddenFill xmlns="" xmlns:a14="http://schemas.microsoft.com/office/drawing/2010/main">
                     <a:noFill/>
                   </a14:hiddenFill>
                 </a:ext>
                 <a:ext uri="{AF507438-7753-43e0-B8FC-AC1667EBCBE1}">
-                  <a14:hiddenEffects xmlns:a14="http://schemas.microsoft.com/office/drawing/2010/main" xmlns="">
+                  <a14:hiddenEffects xmlns="" xmlns:a14="http://schemas.microsoft.com/office/drawing/2010/main">
                     <a:effectLst>
                       <a:outerShdw dist="35921" dir="2700000" algn="ctr" rotWithShape="0">
                         <a:schemeClr val="bg2"/>
@@ -4820,12 +4820,12 @@
               <a:effectLst/>
               <a:extLst>
                 <a:ext uri="{909E8E84-426E-40dd-AFC4-6F175D3DCCD1}">
-                  <a14:hiddenFill xmlns:a14="http://schemas.microsoft.com/office/drawing/2010/main" xmlns="">
+                  <a14:hiddenFill xmlns="" xmlns:a14="http://schemas.microsoft.com/office/drawing/2010/main">
                     <a:noFill/>
                   </a14:hiddenFill>
                 </a:ext>
                 <a:ext uri="{AF507438-7753-43e0-B8FC-AC1667EBCBE1}">
-                  <a14:hiddenEffects xmlns:a14="http://schemas.microsoft.com/office/drawing/2010/main" xmlns="">
+                  <a14:hiddenEffects xmlns="" xmlns:a14="http://schemas.microsoft.com/office/drawing/2010/main">
                     <a:effectLst>
                       <a:outerShdw dist="35921" dir="2700000" algn="ctr" rotWithShape="0">
                         <a:schemeClr val="bg2"/>
@@ -4871,12 +4871,12 @@
               <a:effectLst/>
               <a:extLst>
                 <a:ext uri="{909E8E84-426E-40dd-AFC4-6F175D3DCCD1}">
-                  <a14:hiddenFill xmlns:a14="http://schemas.microsoft.com/office/drawing/2010/main" xmlns="">
+                  <a14:hiddenFill xmlns="" xmlns:a14="http://schemas.microsoft.com/office/drawing/2010/main">
                     <a:noFill/>
                   </a14:hiddenFill>
                 </a:ext>
                 <a:ext uri="{AF507438-7753-43e0-B8FC-AC1667EBCBE1}">
-                  <a14:hiddenEffects xmlns:a14="http://schemas.microsoft.com/office/drawing/2010/main" xmlns="">
+                  <a14:hiddenEffects xmlns="" xmlns:a14="http://schemas.microsoft.com/office/drawing/2010/main">
                     <a:effectLst>
                       <a:outerShdw dist="35921" dir="2700000" algn="ctr" rotWithShape="0">
                         <a:schemeClr val="bg2"/>
@@ -4923,12 +4923,12 @@
             <a:effectLst/>
             <a:extLst>
               <a:ext uri="{909E8E84-426E-40dd-AFC4-6F175D3DCCD1}">
-                <a14:hiddenFill xmlns:a14="http://schemas.microsoft.com/office/drawing/2010/main" xmlns="">
+                <a14:hiddenFill xmlns="" xmlns:a14="http://schemas.microsoft.com/office/drawing/2010/main">
                   <a:noFill/>
                 </a14:hiddenFill>
               </a:ext>
               <a:ext uri="{AF507438-7753-43e0-B8FC-AC1667EBCBE1}">
-                <a14:hiddenEffects xmlns:a14="http://schemas.microsoft.com/office/drawing/2010/main" xmlns="">
+                <a14:hiddenEffects xmlns="" xmlns:a14="http://schemas.microsoft.com/office/drawing/2010/main">
                   <a:effectLst>
                     <a:outerShdw dist="35921" dir="2700000" algn="ctr" rotWithShape="0">
                       <a:schemeClr val="bg2"/>
@@ -4974,12 +4974,12 @@
             <a:effectLst/>
             <a:extLst>
               <a:ext uri="{909E8E84-426E-40dd-AFC4-6F175D3DCCD1}">
-                <a14:hiddenFill xmlns:a14="http://schemas.microsoft.com/office/drawing/2010/main" xmlns="">
+                <a14:hiddenFill xmlns="" xmlns:a14="http://schemas.microsoft.com/office/drawing/2010/main">
                   <a:noFill/>
                 </a14:hiddenFill>
               </a:ext>
               <a:ext uri="{AF507438-7753-43e0-B8FC-AC1667EBCBE1}">
-                <a14:hiddenEffects xmlns:a14="http://schemas.microsoft.com/office/drawing/2010/main" xmlns="">
+                <a14:hiddenEffects xmlns="" xmlns:a14="http://schemas.microsoft.com/office/drawing/2010/main">
                   <a:effectLst>
                     <a:outerShdw dist="35921" dir="2700000" algn="ctr" rotWithShape="0">
                       <a:schemeClr val="bg2"/>
@@ -5091,14 +5091,14 @@
               <a:effectLst/>
               <a:extLst>
                 <a:ext uri="{909E8E84-426E-40dd-AFC4-6F175D3DCCD1}">
-                  <a14:hiddenFill xmlns:a14="http://schemas.microsoft.com/office/drawing/2010/main" xmlns="">
+                  <a14:hiddenFill xmlns="" xmlns:a14="http://schemas.microsoft.com/office/drawing/2010/main">
                     <a:solidFill>
                       <a:srgbClr val="FFFF00"/>
                     </a:solidFill>
                   </a14:hiddenFill>
                 </a:ext>
                 <a:ext uri="{AF507438-7753-43e0-B8FC-AC1667EBCBE1}">
-                  <a14:hiddenEffects xmlns:a14="http://schemas.microsoft.com/office/drawing/2010/main" xmlns="">
+                  <a14:hiddenEffects xmlns="" xmlns:a14="http://schemas.microsoft.com/office/drawing/2010/main">
                     <a:effectLst>
                       <a:outerShdw dist="35921" dir="2700000" algn="ctr" rotWithShape="0">
                         <a:schemeClr val="bg2"/>
@@ -5194,14 +5194,14 @@
               <a:effectLst/>
               <a:extLst>
                 <a:ext uri="{909E8E84-426E-40dd-AFC4-6F175D3DCCD1}">
-                  <a14:hiddenFill xmlns:a14="http://schemas.microsoft.com/office/drawing/2010/main" xmlns="">
+                  <a14:hiddenFill xmlns="" xmlns:a14="http://schemas.microsoft.com/office/drawing/2010/main">
                     <a:solidFill>
                       <a:srgbClr val="FFFF00"/>
                     </a:solidFill>
                   </a14:hiddenFill>
                 </a:ext>
                 <a:ext uri="{AF507438-7753-43e0-B8FC-AC1667EBCBE1}">
-                  <a14:hiddenEffects xmlns:a14="http://schemas.microsoft.com/office/drawing/2010/main" xmlns="">
+                  <a14:hiddenEffects xmlns="" xmlns:a14="http://schemas.microsoft.com/office/drawing/2010/main">
                     <a:effectLst>
                       <a:outerShdw dist="35921" dir="2700000" algn="ctr" rotWithShape="0">
                         <a:schemeClr val="bg2"/>
@@ -5248,12 +5248,12 @@
             <a:effectLst/>
             <a:extLst>
               <a:ext uri="{909E8E84-426E-40dd-AFC4-6F175D3DCCD1}">
-                <a14:hiddenFill xmlns:a14="http://schemas.microsoft.com/office/drawing/2010/main" xmlns="">
+                <a14:hiddenFill xmlns="" xmlns:a14="http://schemas.microsoft.com/office/drawing/2010/main">
                   <a:noFill/>
                 </a14:hiddenFill>
               </a:ext>
               <a:ext uri="{AF507438-7753-43e0-B8FC-AC1667EBCBE1}">
-                <a14:hiddenEffects xmlns:a14="http://schemas.microsoft.com/office/drawing/2010/main" xmlns="">
+                <a14:hiddenEffects xmlns="" xmlns:a14="http://schemas.microsoft.com/office/drawing/2010/main">
                   <a:effectLst>
                     <a:outerShdw dist="35921" dir="2700000" algn="ctr" rotWithShape="0">
                       <a:schemeClr val="bg2"/>
@@ -5299,12 +5299,12 @@
             <a:effectLst/>
             <a:extLst>
               <a:ext uri="{909E8E84-426E-40dd-AFC4-6F175D3DCCD1}">
-                <a14:hiddenFill xmlns:a14="http://schemas.microsoft.com/office/drawing/2010/main" xmlns="">
+                <a14:hiddenFill xmlns="" xmlns:a14="http://schemas.microsoft.com/office/drawing/2010/main">
                   <a:noFill/>
                 </a14:hiddenFill>
               </a:ext>
               <a:ext uri="{AF507438-7753-43e0-B8FC-AC1667EBCBE1}">
-                <a14:hiddenEffects xmlns:a14="http://schemas.microsoft.com/office/drawing/2010/main" xmlns="">
+                <a14:hiddenEffects xmlns="" xmlns:a14="http://schemas.microsoft.com/office/drawing/2010/main">
                   <a:effectLst>
                     <a:outerShdw dist="35921" dir="2700000" algn="ctr" rotWithShape="0">
                       <a:schemeClr val="bg2"/>
@@ -5350,12 +5350,12 @@
             <a:effectLst/>
             <a:extLst>
               <a:ext uri="{909E8E84-426E-40dd-AFC4-6F175D3DCCD1}">
-                <a14:hiddenFill xmlns:a14="http://schemas.microsoft.com/office/drawing/2010/main" xmlns="">
+                <a14:hiddenFill xmlns="" xmlns:a14="http://schemas.microsoft.com/office/drawing/2010/main">
                   <a:noFill/>
                 </a14:hiddenFill>
               </a:ext>
               <a:ext uri="{AF507438-7753-43e0-B8FC-AC1667EBCBE1}">
-                <a14:hiddenEffects xmlns:a14="http://schemas.microsoft.com/office/drawing/2010/main" xmlns="">
+                <a14:hiddenEffects xmlns="" xmlns:a14="http://schemas.microsoft.com/office/drawing/2010/main">
                   <a:effectLst>
                     <a:outerShdw dist="35921" dir="2700000" algn="ctr" rotWithShape="0">
                       <a:schemeClr val="bg2"/>
@@ -5401,12 +5401,12 @@
             <a:effectLst/>
             <a:extLst>
               <a:ext uri="{909E8E84-426E-40dd-AFC4-6F175D3DCCD1}">
-                <a14:hiddenFill xmlns:a14="http://schemas.microsoft.com/office/drawing/2010/main" xmlns="">
+                <a14:hiddenFill xmlns="" xmlns:a14="http://schemas.microsoft.com/office/drawing/2010/main">
                   <a:noFill/>
                 </a14:hiddenFill>
               </a:ext>
               <a:ext uri="{AF507438-7753-43e0-B8FC-AC1667EBCBE1}">
-                <a14:hiddenEffects xmlns:a14="http://schemas.microsoft.com/office/drawing/2010/main" xmlns="">
+                <a14:hiddenEffects xmlns="" xmlns:a14="http://schemas.microsoft.com/office/drawing/2010/main">
                   <a:effectLst>
                     <a:outerShdw dist="35921" dir="2700000" algn="ctr" rotWithShape="0">
                       <a:schemeClr val="bg2"/>
@@ -5452,12 +5452,12 @@
             <a:effectLst/>
             <a:extLst>
               <a:ext uri="{909E8E84-426E-40dd-AFC4-6F175D3DCCD1}">
-                <a14:hiddenFill xmlns:a14="http://schemas.microsoft.com/office/drawing/2010/main" xmlns="">
+                <a14:hiddenFill xmlns="" xmlns:a14="http://schemas.microsoft.com/office/drawing/2010/main">
                   <a:noFill/>
                 </a14:hiddenFill>
               </a:ext>
               <a:ext uri="{AF507438-7753-43e0-B8FC-AC1667EBCBE1}">
-                <a14:hiddenEffects xmlns:a14="http://schemas.microsoft.com/office/drawing/2010/main" xmlns="">
+                <a14:hiddenEffects xmlns="" xmlns:a14="http://schemas.microsoft.com/office/drawing/2010/main">
                   <a:effectLst>
                     <a:outerShdw dist="35921" dir="2700000" algn="ctr" rotWithShape="0">
                       <a:schemeClr val="bg2"/>
@@ -5503,12 +5503,12 @@
             <a:effectLst/>
             <a:extLst>
               <a:ext uri="{909E8E84-426E-40dd-AFC4-6F175D3DCCD1}">
-                <a14:hiddenFill xmlns:a14="http://schemas.microsoft.com/office/drawing/2010/main" xmlns="">
+                <a14:hiddenFill xmlns="" xmlns:a14="http://schemas.microsoft.com/office/drawing/2010/main">
                   <a:noFill/>
                 </a14:hiddenFill>
               </a:ext>
               <a:ext uri="{AF507438-7753-43e0-B8FC-AC1667EBCBE1}">
-                <a14:hiddenEffects xmlns:a14="http://schemas.microsoft.com/office/drawing/2010/main" xmlns="">
+                <a14:hiddenEffects xmlns="" xmlns:a14="http://schemas.microsoft.com/office/drawing/2010/main">
                   <a:effectLst>
                     <a:outerShdw dist="35921" dir="2700000" algn="ctr" rotWithShape="0">
                       <a:schemeClr val="bg2"/>
@@ -5620,14 +5620,14 @@
               <a:effectLst/>
               <a:extLst>
                 <a:ext uri="{909E8E84-426E-40dd-AFC4-6F175D3DCCD1}">
-                  <a14:hiddenFill xmlns:a14="http://schemas.microsoft.com/office/drawing/2010/main" xmlns="">
+                  <a14:hiddenFill xmlns="" xmlns:a14="http://schemas.microsoft.com/office/drawing/2010/main">
                     <a:solidFill>
                       <a:srgbClr val="FFFF00"/>
                     </a:solidFill>
                   </a14:hiddenFill>
                 </a:ext>
                 <a:ext uri="{AF507438-7753-43e0-B8FC-AC1667EBCBE1}">
-                  <a14:hiddenEffects xmlns:a14="http://schemas.microsoft.com/office/drawing/2010/main" xmlns="">
+                  <a14:hiddenEffects xmlns="" xmlns:a14="http://schemas.microsoft.com/office/drawing/2010/main">
                     <a:effectLst>
                       <a:outerShdw dist="35921" dir="2700000" algn="ctr" rotWithShape="0">
                         <a:schemeClr val="bg2"/>
@@ -5723,14 +5723,14 @@
               <a:effectLst/>
               <a:extLst>
                 <a:ext uri="{909E8E84-426E-40dd-AFC4-6F175D3DCCD1}">
-                  <a14:hiddenFill xmlns:a14="http://schemas.microsoft.com/office/drawing/2010/main" xmlns="">
+                  <a14:hiddenFill xmlns="" xmlns:a14="http://schemas.microsoft.com/office/drawing/2010/main">
                     <a:solidFill>
                       <a:srgbClr val="FFFF00"/>
                     </a:solidFill>
                   </a14:hiddenFill>
                 </a:ext>
                 <a:ext uri="{AF507438-7753-43e0-B8FC-AC1667EBCBE1}">
-                  <a14:hiddenEffects xmlns:a14="http://schemas.microsoft.com/office/drawing/2010/main" xmlns="">
+                  <a14:hiddenEffects xmlns="" xmlns:a14="http://schemas.microsoft.com/office/drawing/2010/main">
                     <a:effectLst>
                       <a:outerShdw dist="35921" dir="2700000" algn="ctr" rotWithShape="0">
                         <a:schemeClr val="bg2"/>
@@ -5777,12 +5777,12 @@
             <a:effectLst/>
             <a:extLst>
               <a:ext uri="{909E8E84-426E-40dd-AFC4-6F175D3DCCD1}">
-                <a14:hiddenFill xmlns:a14="http://schemas.microsoft.com/office/drawing/2010/main" xmlns="">
+                <a14:hiddenFill xmlns="" xmlns:a14="http://schemas.microsoft.com/office/drawing/2010/main">
                   <a:noFill/>
                 </a14:hiddenFill>
               </a:ext>
               <a:ext uri="{AF507438-7753-43e0-B8FC-AC1667EBCBE1}">
-                <a14:hiddenEffects xmlns:a14="http://schemas.microsoft.com/office/drawing/2010/main" xmlns="">
+                <a14:hiddenEffects xmlns="" xmlns:a14="http://schemas.microsoft.com/office/drawing/2010/main">
                   <a:effectLst>
                     <a:outerShdw dist="35921" dir="2700000" algn="ctr" rotWithShape="0">
                       <a:schemeClr val="bg2"/>
@@ -5894,14 +5894,14 @@
               <a:effectLst/>
               <a:extLst>
                 <a:ext uri="{909E8E84-426E-40dd-AFC4-6F175D3DCCD1}">
-                  <a14:hiddenFill xmlns:a14="http://schemas.microsoft.com/office/drawing/2010/main" xmlns="">
+                  <a14:hiddenFill xmlns="" xmlns:a14="http://schemas.microsoft.com/office/drawing/2010/main">
                     <a:solidFill>
                       <a:srgbClr val="FFFF00"/>
                     </a:solidFill>
                   </a14:hiddenFill>
                 </a:ext>
                 <a:ext uri="{AF507438-7753-43e0-B8FC-AC1667EBCBE1}">
-                  <a14:hiddenEffects xmlns:a14="http://schemas.microsoft.com/office/drawing/2010/main" xmlns="">
+                  <a14:hiddenEffects xmlns="" xmlns:a14="http://schemas.microsoft.com/office/drawing/2010/main">
                     <a:effectLst>
                       <a:outerShdw dist="35921" dir="2700000" algn="ctr" rotWithShape="0">
                         <a:schemeClr val="bg2"/>
@@ -5997,14 +5997,14 @@
               <a:effectLst/>
               <a:extLst>
                 <a:ext uri="{909E8E84-426E-40dd-AFC4-6F175D3DCCD1}">
-                  <a14:hiddenFill xmlns:a14="http://schemas.microsoft.com/office/drawing/2010/main" xmlns="">
+                  <a14:hiddenFill xmlns="" xmlns:a14="http://schemas.microsoft.com/office/drawing/2010/main">
                     <a:solidFill>
                       <a:srgbClr val="FFFF00"/>
                     </a:solidFill>
                   </a14:hiddenFill>
                 </a:ext>
                 <a:ext uri="{AF507438-7753-43e0-B8FC-AC1667EBCBE1}">
-                  <a14:hiddenEffects xmlns:a14="http://schemas.microsoft.com/office/drawing/2010/main" xmlns="">
+                  <a14:hiddenEffects xmlns="" xmlns:a14="http://schemas.microsoft.com/office/drawing/2010/main">
                     <a:effectLst>
                       <a:outerShdw dist="35921" dir="2700000" algn="ctr" rotWithShape="0">
                         <a:schemeClr val="bg2"/>
@@ -6267,12 +6267,12 @@
             <a:effectLst/>
             <a:extLst>
               <a:ext uri="{909E8E84-426E-40dd-AFC4-6F175D3DCCD1}">
-                <a14:hiddenFill xmlns:a14="http://schemas.microsoft.com/office/drawing/2010/main" xmlns="">
+                <a14:hiddenFill xmlns="" xmlns:a14="http://schemas.microsoft.com/office/drawing/2010/main">
                   <a:noFill/>
                 </a14:hiddenFill>
               </a:ext>
               <a:ext uri="{AF507438-7753-43e0-B8FC-AC1667EBCBE1}">
-                <a14:hiddenEffects xmlns:a14="http://schemas.microsoft.com/office/drawing/2010/main" xmlns="">
+                <a14:hiddenEffects xmlns="" xmlns:a14="http://schemas.microsoft.com/office/drawing/2010/main">
                   <a:effectLst>
                     <a:outerShdw dist="35921" dir="2700000" algn="ctr" rotWithShape="0">
                       <a:schemeClr val="bg2"/>
@@ -6318,12 +6318,12 @@
             <a:effectLst/>
             <a:extLst>
               <a:ext uri="{909E8E84-426E-40dd-AFC4-6F175D3DCCD1}">
-                <a14:hiddenFill xmlns:a14="http://schemas.microsoft.com/office/drawing/2010/main" xmlns="">
+                <a14:hiddenFill xmlns="" xmlns:a14="http://schemas.microsoft.com/office/drawing/2010/main">
                   <a:noFill/>
                 </a14:hiddenFill>
               </a:ext>
               <a:ext uri="{AF507438-7753-43e0-B8FC-AC1667EBCBE1}">
-                <a14:hiddenEffects xmlns:a14="http://schemas.microsoft.com/office/drawing/2010/main" xmlns="">
+                <a14:hiddenEffects xmlns="" xmlns:a14="http://schemas.microsoft.com/office/drawing/2010/main">
                   <a:effectLst>
                     <a:outerShdw dist="35921" dir="2700000" algn="ctr" rotWithShape="0">
                       <a:schemeClr val="bg2"/>
@@ -6369,12 +6369,12 @@
             <a:effectLst/>
             <a:extLst>
               <a:ext uri="{909E8E84-426E-40dd-AFC4-6F175D3DCCD1}">
-                <a14:hiddenFill xmlns:a14="http://schemas.microsoft.com/office/drawing/2010/main" xmlns="">
+                <a14:hiddenFill xmlns="" xmlns:a14="http://schemas.microsoft.com/office/drawing/2010/main">
                   <a:noFill/>
                 </a14:hiddenFill>
               </a:ext>
               <a:ext uri="{AF507438-7753-43e0-B8FC-AC1667EBCBE1}">
-                <a14:hiddenEffects xmlns:a14="http://schemas.microsoft.com/office/drawing/2010/main" xmlns="">
+                <a14:hiddenEffects xmlns="" xmlns:a14="http://schemas.microsoft.com/office/drawing/2010/main">
                   <a:effectLst>
                     <a:outerShdw dist="35921" dir="2700000" algn="ctr" rotWithShape="0">
                       <a:schemeClr val="bg2"/>
@@ -6420,12 +6420,12 @@
             <a:effectLst/>
             <a:extLst>
               <a:ext uri="{909E8E84-426E-40dd-AFC4-6F175D3DCCD1}">
-                <a14:hiddenFill xmlns:a14="http://schemas.microsoft.com/office/drawing/2010/main" xmlns="">
+                <a14:hiddenFill xmlns="" xmlns:a14="http://schemas.microsoft.com/office/drawing/2010/main">
                   <a:noFill/>
                 </a14:hiddenFill>
               </a:ext>
               <a:ext uri="{AF507438-7753-43e0-B8FC-AC1667EBCBE1}">
-                <a14:hiddenEffects xmlns:a14="http://schemas.microsoft.com/office/drawing/2010/main" xmlns="">
+                <a14:hiddenEffects xmlns="" xmlns:a14="http://schemas.microsoft.com/office/drawing/2010/main">
                   <a:effectLst>
                     <a:outerShdw dist="35921" dir="2700000" algn="ctr" rotWithShape="0">
                       <a:schemeClr val="bg2"/>
@@ -6537,14 +6537,14 @@
               <a:effectLst/>
               <a:extLst>
                 <a:ext uri="{909E8E84-426E-40dd-AFC4-6F175D3DCCD1}">
-                  <a14:hiddenFill xmlns:a14="http://schemas.microsoft.com/office/drawing/2010/main" xmlns="">
+                  <a14:hiddenFill xmlns="" xmlns:a14="http://schemas.microsoft.com/office/drawing/2010/main">
                     <a:solidFill>
                       <a:srgbClr val="FFFF00"/>
                     </a:solidFill>
                   </a14:hiddenFill>
                 </a:ext>
                 <a:ext uri="{AF507438-7753-43e0-B8FC-AC1667EBCBE1}">
-                  <a14:hiddenEffects xmlns:a14="http://schemas.microsoft.com/office/drawing/2010/main" xmlns="">
+                  <a14:hiddenEffects xmlns="" xmlns:a14="http://schemas.microsoft.com/office/drawing/2010/main">
                     <a:effectLst>
                       <a:outerShdw dist="35921" dir="2700000" algn="ctr" rotWithShape="0">
                         <a:schemeClr val="bg2"/>
@@ -6640,14 +6640,14 @@
               <a:effectLst/>
               <a:extLst>
                 <a:ext uri="{909E8E84-426E-40dd-AFC4-6F175D3DCCD1}">
-                  <a14:hiddenFill xmlns:a14="http://schemas.microsoft.com/office/drawing/2010/main" xmlns="">
+                  <a14:hiddenFill xmlns="" xmlns:a14="http://schemas.microsoft.com/office/drawing/2010/main">
                     <a:solidFill>
                       <a:srgbClr val="FFFF00"/>
                     </a:solidFill>
                   </a14:hiddenFill>
                 </a:ext>
                 <a:ext uri="{AF507438-7753-43e0-B8FC-AC1667EBCBE1}">
-                  <a14:hiddenEffects xmlns:a14="http://schemas.microsoft.com/office/drawing/2010/main" xmlns="">
+                  <a14:hiddenEffects xmlns="" xmlns:a14="http://schemas.microsoft.com/office/drawing/2010/main">
                     <a:effectLst>
                       <a:outerShdw dist="35921" dir="2700000" algn="ctr" rotWithShape="0">
                         <a:schemeClr val="bg2"/>
@@ -6694,12 +6694,12 @@
             <a:effectLst/>
             <a:extLst>
               <a:ext uri="{909E8E84-426E-40dd-AFC4-6F175D3DCCD1}">
-                <a14:hiddenFill xmlns:a14="http://schemas.microsoft.com/office/drawing/2010/main" xmlns="">
+                <a14:hiddenFill xmlns="" xmlns:a14="http://schemas.microsoft.com/office/drawing/2010/main">
                   <a:noFill/>
                 </a14:hiddenFill>
               </a:ext>
               <a:ext uri="{AF507438-7753-43e0-B8FC-AC1667EBCBE1}">
-                <a14:hiddenEffects xmlns:a14="http://schemas.microsoft.com/office/drawing/2010/main" xmlns="">
+                <a14:hiddenEffects xmlns="" xmlns:a14="http://schemas.microsoft.com/office/drawing/2010/main">
                   <a:effectLst>
                     <a:outerShdw dist="35921" dir="2700000" algn="ctr" rotWithShape="0">
                       <a:schemeClr val="bg2"/>
@@ -6745,12 +6745,12 @@
             <a:effectLst/>
             <a:extLst>
               <a:ext uri="{909E8E84-426E-40dd-AFC4-6F175D3DCCD1}">
-                <a14:hiddenFill xmlns:a14="http://schemas.microsoft.com/office/drawing/2010/main" xmlns="">
+                <a14:hiddenFill xmlns="" xmlns:a14="http://schemas.microsoft.com/office/drawing/2010/main">
                   <a:noFill/>
                 </a14:hiddenFill>
               </a:ext>
               <a:ext uri="{AF507438-7753-43e0-B8FC-AC1667EBCBE1}">
-                <a14:hiddenEffects xmlns:a14="http://schemas.microsoft.com/office/drawing/2010/main" xmlns="">
+                <a14:hiddenEffects xmlns="" xmlns:a14="http://schemas.microsoft.com/office/drawing/2010/main">
                   <a:effectLst>
                     <a:outerShdw dist="35921" dir="2700000" algn="ctr" rotWithShape="0">
                       <a:schemeClr val="bg2"/>
@@ -6796,12 +6796,12 @@
             <a:effectLst/>
             <a:extLst>
               <a:ext uri="{909E8E84-426E-40dd-AFC4-6F175D3DCCD1}">
-                <a14:hiddenFill xmlns:a14="http://schemas.microsoft.com/office/drawing/2010/main" xmlns="">
+                <a14:hiddenFill xmlns="" xmlns:a14="http://schemas.microsoft.com/office/drawing/2010/main">
                   <a:noFill/>
                 </a14:hiddenFill>
               </a:ext>
               <a:ext uri="{AF507438-7753-43e0-B8FC-AC1667EBCBE1}">
-                <a14:hiddenEffects xmlns:a14="http://schemas.microsoft.com/office/drawing/2010/main" xmlns="">
+                <a14:hiddenEffects xmlns="" xmlns:a14="http://schemas.microsoft.com/office/drawing/2010/main">
                   <a:effectLst>
                     <a:outerShdw dist="35921" dir="2700000" algn="ctr" rotWithShape="0">
                       <a:schemeClr val="bg2"/>
@@ -6847,12 +6847,12 @@
             <a:effectLst/>
             <a:extLst>
               <a:ext uri="{909E8E84-426E-40dd-AFC4-6F175D3DCCD1}">
-                <a14:hiddenFill xmlns:a14="http://schemas.microsoft.com/office/drawing/2010/main" xmlns="">
+                <a14:hiddenFill xmlns="" xmlns:a14="http://schemas.microsoft.com/office/drawing/2010/main">
                   <a:noFill/>
                 </a14:hiddenFill>
               </a:ext>
               <a:ext uri="{AF507438-7753-43e0-B8FC-AC1667EBCBE1}">
-                <a14:hiddenEffects xmlns:a14="http://schemas.microsoft.com/office/drawing/2010/main" xmlns="">
+                <a14:hiddenEffects xmlns="" xmlns:a14="http://schemas.microsoft.com/office/drawing/2010/main">
                   <a:effectLst>
                     <a:outerShdw dist="35921" dir="2700000" algn="ctr" rotWithShape="0">
                       <a:schemeClr val="bg2"/>
@@ -6898,12 +6898,12 @@
             <a:effectLst/>
             <a:extLst>
               <a:ext uri="{909E8E84-426E-40dd-AFC4-6F175D3DCCD1}">
-                <a14:hiddenFill xmlns:a14="http://schemas.microsoft.com/office/drawing/2010/main" xmlns="">
+                <a14:hiddenFill xmlns="" xmlns:a14="http://schemas.microsoft.com/office/drawing/2010/main">
                   <a:noFill/>
                 </a14:hiddenFill>
               </a:ext>
               <a:ext uri="{AF507438-7753-43e0-B8FC-AC1667EBCBE1}">
-                <a14:hiddenEffects xmlns:a14="http://schemas.microsoft.com/office/drawing/2010/main" xmlns="">
+                <a14:hiddenEffects xmlns="" xmlns:a14="http://schemas.microsoft.com/office/drawing/2010/main">
                   <a:effectLst>
                     <a:outerShdw dist="35921" dir="2700000" algn="ctr" rotWithShape="0">
                       <a:schemeClr val="bg2"/>
@@ -6949,12 +6949,12 @@
             <a:effectLst/>
             <a:extLst>
               <a:ext uri="{909E8E84-426E-40dd-AFC4-6F175D3DCCD1}">
-                <a14:hiddenFill xmlns:a14="http://schemas.microsoft.com/office/drawing/2010/main" xmlns="">
+                <a14:hiddenFill xmlns="" xmlns:a14="http://schemas.microsoft.com/office/drawing/2010/main">
                   <a:noFill/>
                 </a14:hiddenFill>
               </a:ext>
               <a:ext uri="{AF507438-7753-43e0-B8FC-AC1667EBCBE1}">
-                <a14:hiddenEffects xmlns:a14="http://schemas.microsoft.com/office/drawing/2010/main" xmlns="">
+                <a14:hiddenEffects xmlns="" xmlns:a14="http://schemas.microsoft.com/office/drawing/2010/main">
                   <a:effectLst>
                     <a:outerShdw dist="35921" dir="2700000" algn="ctr" rotWithShape="0">
                       <a:schemeClr val="bg2"/>
@@ -7000,12 +7000,12 @@
             <a:effectLst/>
             <a:extLst>
               <a:ext uri="{909E8E84-426E-40dd-AFC4-6F175D3DCCD1}">
-                <a14:hiddenFill xmlns:a14="http://schemas.microsoft.com/office/drawing/2010/main" xmlns="">
+                <a14:hiddenFill xmlns="" xmlns:a14="http://schemas.microsoft.com/office/drawing/2010/main">
                   <a:noFill/>
                 </a14:hiddenFill>
               </a:ext>
               <a:ext uri="{AF507438-7753-43e0-B8FC-AC1667EBCBE1}">
-                <a14:hiddenEffects xmlns:a14="http://schemas.microsoft.com/office/drawing/2010/main" xmlns="">
+                <a14:hiddenEffects xmlns="" xmlns:a14="http://schemas.microsoft.com/office/drawing/2010/main">
                   <a:effectLst>
                     <a:outerShdw dist="35921" dir="2700000" algn="ctr" rotWithShape="0">
                       <a:schemeClr val="bg2"/>
@@ -7051,12 +7051,12 @@
             <a:effectLst/>
             <a:extLst>
               <a:ext uri="{909E8E84-426E-40dd-AFC4-6F175D3DCCD1}">
-                <a14:hiddenFill xmlns:a14="http://schemas.microsoft.com/office/drawing/2010/main" xmlns="">
+                <a14:hiddenFill xmlns="" xmlns:a14="http://schemas.microsoft.com/office/drawing/2010/main">
                   <a:noFill/>
                 </a14:hiddenFill>
               </a:ext>
               <a:ext uri="{AF507438-7753-43e0-B8FC-AC1667EBCBE1}">
-                <a14:hiddenEffects xmlns:a14="http://schemas.microsoft.com/office/drawing/2010/main" xmlns="">
+                <a14:hiddenEffects xmlns="" xmlns:a14="http://schemas.microsoft.com/office/drawing/2010/main">
                   <a:effectLst>
                     <a:outerShdw dist="35921" dir="2700000" algn="ctr" rotWithShape="0">
                       <a:schemeClr val="bg2"/>
@@ -7102,12 +7102,12 @@
             <a:effectLst/>
             <a:extLst>
               <a:ext uri="{909E8E84-426E-40dd-AFC4-6F175D3DCCD1}">
-                <a14:hiddenFill xmlns:a14="http://schemas.microsoft.com/office/drawing/2010/main" xmlns="">
+                <a14:hiddenFill xmlns="" xmlns:a14="http://schemas.microsoft.com/office/drawing/2010/main">
                   <a:noFill/>
                 </a14:hiddenFill>
               </a:ext>
               <a:ext uri="{AF507438-7753-43e0-B8FC-AC1667EBCBE1}">
-                <a14:hiddenEffects xmlns:a14="http://schemas.microsoft.com/office/drawing/2010/main" xmlns="">
+                <a14:hiddenEffects xmlns="" xmlns:a14="http://schemas.microsoft.com/office/drawing/2010/main">
                   <a:effectLst>
                     <a:outerShdw dist="35921" dir="2700000" algn="ctr" rotWithShape="0">
                       <a:schemeClr val="bg2"/>
@@ -7153,12 +7153,12 @@
             <a:effectLst/>
             <a:extLst>
               <a:ext uri="{909E8E84-426E-40dd-AFC4-6F175D3DCCD1}">
-                <a14:hiddenFill xmlns:a14="http://schemas.microsoft.com/office/drawing/2010/main" xmlns="">
+                <a14:hiddenFill xmlns="" xmlns:a14="http://schemas.microsoft.com/office/drawing/2010/main">
                   <a:noFill/>
                 </a14:hiddenFill>
               </a:ext>
               <a:ext uri="{AF507438-7753-43e0-B8FC-AC1667EBCBE1}">
-                <a14:hiddenEffects xmlns:a14="http://schemas.microsoft.com/office/drawing/2010/main" xmlns="">
+                <a14:hiddenEffects xmlns="" xmlns:a14="http://schemas.microsoft.com/office/drawing/2010/main">
                   <a:effectLst>
                     <a:outerShdw dist="35921" dir="2700000" algn="ctr" rotWithShape="0">
                       <a:schemeClr val="bg2"/>
@@ -7204,12 +7204,12 @@
             <a:effectLst/>
             <a:extLst>
               <a:ext uri="{909E8E84-426E-40dd-AFC4-6F175D3DCCD1}">
-                <a14:hiddenFill xmlns:a14="http://schemas.microsoft.com/office/drawing/2010/main" xmlns="">
+                <a14:hiddenFill xmlns="" xmlns:a14="http://schemas.microsoft.com/office/drawing/2010/main">
                   <a:noFill/>
                 </a14:hiddenFill>
               </a:ext>
               <a:ext uri="{AF507438-7753-43e0-B8FC-AC1667EBCBE1}">
-                <a14:hiddenEffects xmlns:a14="http://schemas.microsoft.com/office/drawing/2010/main" xmlns="">
+                <a14:hiddenEffects xmlns="" xmlns:a14="http://schemas.microsoft.com/office/drawing/2010/main">
                   <a:effectLst>
                     <a:outerShdw dist="35921" dir="2700000" algn="ctr" rotWithShape="0">
                       <a:schemeClr val="bg2"/>
@@ -7255,12 +7255,12 @@
             <a:effectLst/>
             <a:extLst>
               <a:ext uri="{909E8E84-426E-40dd-AFC4-6F175D3DCCD1}">
-                <a14:hiddenFill xmlns:a14="http://schemas.microsoft.com/office/drawing/2010/main" xmlns="">
+                <a14:hiddenFill xmlns="" xmlns:a14="http://schemas.microsoft.com/office/drawing/2010/main">
                   <a:noFill/>
                 </a14:hiddenFill>
               </a:ext>
               <a:ext uri="{AF507438-7753-43e0-B8FC-AC1667EBCBE1}">
-                <a14:hiddenEffects xmlns:a14="http://schemas.microsoft.com/office/drawing/2010/main" xmlns="">
+                <a14:hiddenEffects xmlns="" xmlns:a14="http://schemas.microsoft.com/office/drawing/2010/main">
                   <a:effectLst>
                     <a:outerShdw dist="35921" dir="2700000" algn="ctr" rotWithShape="0">
                       <a:schemeClr val="bg2"/>
@@ -7372,14 +7372,14 @@
               <a:effectLst/>
               <a:extLst>
                 <a:ext uri="{909E8E84-426E-40dd-AFC4-6F175D3DCCD1}">
-                  <a14:hiddenFill xmlns:a14="http://schemas.microsoft.com/office/drawing/2010/main" xmlns="">
+                  <a14:hiddenFill xmlns="" xmlns:a14="http://schemas.microsoft.com/office/drawing/2010/main">
                     <a:solidFill>
                       <a:srgbClr val="FFFF00"/>
                     </a:solidFill>
                   </a14:hiddenFill>
                 </a:ext>
                 <a:ext uri="{AF507438-7753-43e0-B8FC-AC1667EBCBE1}">
-                  <a14:hiddenEffects xmlns:a14="http://schemas.microsoft.com/office/drawing/2010/main" xmlns="">
+                  <a14:hiddenEffects xmlns="" xmlns:a14="http://schemas.microsoft.com/office/drawing/2010/main">
                     <a:effectLst>
                       <a:outerShdw dist="35921" dir="2700000" algn="ctr" rotWithShape="0">
                         <a:schemeClr val="bg2"/>
@@ -7475,14 +7475,14 @@
               <a:effectLst/>
               <a:extLst>
                 <a:ext uri="{909E8E84-426E-40dd-AFC4-6F175D3DCCD1}">
-                  <a14:hiddenFill xmlns:a14="http://schemas.microsoft.com/office/drawing/2010/main" xmlns="">
+                  <a14:hiddenFill xmlns="" xmlns:a14="http://schemas.microsoft.com/office/drawing/2010/main">
                     <a:solidFill>
                       <a:srgbClr val="FFFF00"/>
                     </a:solidFill>
                   </a14:hiddenFill>
                 </a:ext>
                 <a:ext uri="{AF507438-7753-43e0-B8FC-AC1667EBCBE1}">
-                  <a14:hiddenEffects xmlns:a14="http://schemas.microsoft.com/office/drawing/2010/main" xmlns="">
+                  <a14:hiddenEffects xmlns="" xmlns:a14="http://schemas.microsoft.com/office/drawing/2010/main">
                     <a:effectLst>
                       <a:outerShdw dist="35921" dir="2700000" algn="ctr" rotWithShape="0">
                         <a:schemeClr val="bg2"/>
@@ -7529,12 +7529,12 @@
             <a:effectLst/>
             <a:extLst>
               <a:ext uri="{909E8E84-426E-40dd-AFC4-6F175D3DCCD1}">
-                <a14:hiddenFill xmlns:a14="http://schemas.microsoft.com/office/drawing/2010/main" xmlns="">
+                <a14:hiddenFill xmlns="" xmlns:a14="http://schemas.microsoft.com/office/drawing/2010/main">
                   <a:noFill/>
                 </a14:hiddenFill>
               </a:ext>
               <a:ext uri="{AF507438-7753-43e0-B8FC-AC1667EBCBE1}">
-                <a14:hiddenEffects xmlns:a14="http://schemas.microsoft.com/office/drawing/2010/main" xmlns="">
+                <a14:hiddenEffects xmlns="" xmlns:a14="http://schemas.microsoft.com/office/drawing/2010/main">
                   <a:effectLst>
                     <a:outerShdw dist="35921" dir="2700000" algn="ctr" rotWithShape="0">
                       <a:schemeClr val="bg2"/>
@@ -7580,12 +7580,12 @@
             <a:effectLst/>
             <a:extLst>
               <a:ext uri="{909E8E84-426E-40dd-AFC4-6F175D3DCCD1}">
-                <a14:hiddenFill xmlns:a14="http://schemas.microsoft.com/office/drawing/2010/main" xmlns="">
+                <a14:hiddenFill xmlns="" xmlns:a14="http://schemas.microsoft.com/office/drawing/2010/main">
                   <a:noFill/>
                 </a14:hiddenFill>
               </a:ext>
               <a:ext uri="{AF507438-7753-43e0-B8FC-AC1667EBCBE1}">
-                <a14:hiddenEffects xmlns:a14="http://schemas.microsoft.com/office/drawing/2010/main" xmlns="">
+                <a14:hiddenEffects xmlns="" xmlns:a14="http://schemas.microsoft.com/office/drawing/2010/main">
                   <a:effectLst>
                     <a:outerShdw dist="35921" dir="2700000" algn="ctr" rotWithShape="0">
                       <a:schemeClr val="bg2"/>
@@ -7631,12 +7631,12 @@
             <a:effectLst/>
             <a:extLst>
               <a:ext uri="{909E8E84-426E-40dd-AFC4-6F175D3DCCD1}">
-                <a14:hiddenFill xmlns:a14="http://schemas.microsoft.com/office/drawing/2010/main" xmlns="">
+                <a14:hiddenFill xmlns="" xmlns:a14="http://schemas.microsoft.com/office/drawing/2010/main">
                   <a:noFill/>
                 </a14:hiddenFill>
               </a:ext>
               <a:ext uri="{AF507438-7753-43e0-B8FC-AC1667EBCBE1}">
-                <a14:hiddenEffects xmlns:a14="http://schemas.microsoft.com/office/drawing/2010/main" xmlns="">
+                <a14:hiddenEffects xmlns="" xmlns:a14="http://schemas.microsoft.com/office/drawing/2010/main">
                   <a:effectLst>
                     <a:outerShdw dist="35921" dir="2700000" algn="ctr" rotWithShape="0">
                       <a:schemeClr val="bg2"/>
@@ -7682,12 +7682,12 @@
             <a:effectLst/>
             <a:extLst>
               <a:ext uri="{909E8E84-426E-40dd-AFC4-6F175D3DCCD1}">
-                <a14:hiddenFill xmlns:a14="http://schemas.microsoft.com/office/drawing/2010/main" xmlns="">
+                <a14:hiddenFill xmlns="" xmlns:a14="http://schemas.microsoft.com/office/drawing/2010/main">
                   <a:noFill/>
                 </a14:hiddenFill>
               </a:ext>
               <a:ext uri="{AF507438-7753-43e0-B8FC-AC1667EBCBE1}">
-                <a14:hiddenEffects xmlns:a14="http://schemas.microsoft.com/office/drawing/2010/main" xmlns="">
+                <a14:hiddenEffects xmlns="" xmlns:a14="http://schemas.microsoft.com/office/drawing/2010/main">
                   <a:effectLst>
                     <a:outerShdw dist="35921" dir="2700000" algn="ctr" rotWithShape="0">
                       <a:schemeClr val="bg2"/>
@@ -7733,12 +7733,12 @@
             <a:effectLst/>
             <a:extLst>
               <a:ext uri="{909E8E84-426E-40dd-AFC4-6F175D3DCCD1}">
-                <a14:hiddenFill xmlns:a14="http://schemas.microsoft.com/office/drawing/2010/main" xmlns="">
+                <a14:hiddenFill xmlns="" xmlns:a14="http://schemas.microsoft.com/office/drawing/2010/main">
                   <a:noFill/>
                 </a14:hiddenFill>
               </a:ext>
               <a:ext uri="{AF507438-7753-43e0-B8FC-AC1667EBCBE1}">
-                <a14:hiddenEffects xmlns:a14="http://schemas.microsoft.com/office/drawing/2010/main" xmlns="">
+                <a14:hiddenEffects xmlns="" xmlns:a14="http://schemas.microsoft.com/office/drawing/2010/main">
                   <a:effectLst>
                     <a:outerShdw dist="35921" dir="2700000" algn="ctr" rotWithShape="0">
                       <a:schemeClr val="bg2"/>
@@ -7784,12 +7784,12 @@
             <a:effectLst/>
             <a:extLst>
               <a:ext uri="{909E8E84-426E-40dd-AFC4-6F175D3DCCD1}">
-                <a14:hiddenFill xmlns:a14="http://schemas.microsoft.com/office/drawing/2010/main" xmlns="">
+                <a14:hiddenFill xmlns="" xmlns:a14="http://schemas.microsoft.com/office/drawing/2010/main">
                   <a:noFill/>
                 </a14:hiddenFill>
               </a:ext>
               <a:ext uri="{AF507438-7753-43e0-B8FC-AC1667EBCBE1}">
-                <a14:hiddenEffects xmlns:a14="http://schemas.microsoft.com/office/drawing/2010/main" xmlns="">
+                <a14:hiddenEffects xmlns="" xmlns:a14="http://schemas.microsoft.com/office/drawing/2010/main">
                   <a:effectLst>
                     <a:outerShdw dist="35921" dir="2700000" algn="ctr" rotWithShape="0">
                       <a:schemeClr val="bg2"/>
@@ -7835,12 +7835,12 @@
             <a:effectLst/>
             <a:extLst>
               <a:ext uri="{909E8E84-426E-40dd-AFC4-6F175D3DCCD1}">
-                <a14:hiddenFill xmlns:a14="http://schemas.microsoft.com/office/drawing/2010/main" xmlns="">
+                <a14:hiddenFill xmlns="" xmlns:a14="http://schemas.microsoft.com/office/drawing/2010/main">
                   <a:noFill/>
                 </a14:hiddenFill>
               </a:ext>
               <a:ext uri="{AF507438-7753-43e0-B8FC-AC1667EBCBE1}">
-                <a14:hiddenEffects xmlns:a14="http://schemas.microsoft.com/office/drawing/2010/main" xmlns="">
+                <a14:hiddenEffects xmlns="" xmlns:a14="http://schemas.microsoft.com/office/drawing/2010/main">
                   <a:effectLst>
                     <a:outerShdw dist="35921" dir="2700000" algn="ctr" rotWithShape="0">
                       <a:schemeClr val="bg2"/>
@@ -7886,12 +7886,12 @@
             <a:effectLst/>
             <a:extLst>
               <a:ext uri="{909E8E84-426E-40dd-AFC4-6F175D3DCCD1}">
-                <a14:hiddenFill xmlns:a14="http://schemas.microsoft.com/office/drawing/2010/main" xmlns="">
+                <a14:hiddenFill xmlns="" xmlns:a14="http://schemas.microsoft.com/office/drawing/2010/main">
                   <a:noFill/>
                 </a14:hiddenFill>
               </a:ext>
               <a:ext uri="{AF507438-7753-43e0-B8FC-AC1667EBCBE1}">
-                <a14:hiddenEffects xmlns:a14="http://schemas.microsoft.com/office/drawing/2010/main" xmlns="">
+                <a14:hiddenEffects xmlns="" xmlns:a14="http://schemas.microsoft.com/office/drawing/2010/main">
                   <a:effectLst>
                     <a:outerShdw dist="35921" dir="2700000" algn="ctr" rotWithShape="0">
                       <a:schemeClr val="bg2"/>
@@ -7937,12 +7937,12 @@
             <a:effectLst/>
             <a:extLst>
               <a:ext uri="{909E8E84-426E-40dd-AFC4-6F175D3DCCD1}">
-                <a14:hiddenFill xmlns:a14="http://schemas.microsoft.com/office/drawing/2010/main" xmlns="">
+                <a14:hiddenFill xmlns="" xmlns:a14="http://schemas.microsoft.com/office/drawing/2010/main">
                   <a:noFill/>
                 </a14:hiddenFill>
               </a:ext>
               <a:ext uri="{AF507438-7753-43e0-B8FC-AC1667EBCBE1}">
-                <a14:hiddenEffects xmlns:a14="http://schemas.microsoft.com/office/drawing/2010/main" xmlns="">
+                <a14:hiddenEffects xmlns="" xmlns:a14="http://schemas.microsoft.com/office/drawing/2010/main">
                   <a:effectLst>
                     <a:outerShdw dist="35921" dir="2700000" algn="ctr" rotWithShape="0">
                       <a:schemeClr val="bg2"/>
@@ -7988,12 +7988,12 @@
             <a:effectLst/>
             <a:extLst>
               <a:ext uri="{909E8E84-426E-40dd-AFC4-6F175D3DCCD1}">
-                <a14:hiddenFill xmlns:a14="http://schemas.microsoft.com/office/drawing/2010/main" xmlns="">
+                <a14:hiddenFill xmlns="" xmlns:a14="http://schemas.microsoft.com/office/drawing/2010/main">
                   <a:noFill/>
                 </a14:hiddenFill>
               </a:ext>
               <a:ext uri="{AF507438-7753-43e0-B8FC-AC1667EBCBE1}">
-                <a14:hiddenEffects xmlns:a14="http://schemas.microsoft.com/office/drawing/2010/main" xmlns="">
+                <a14:hiddenEffects xmlns="" xmlns:a14="http://schemas.microsoft.com/office/drawing/2010/main">
                   <a:effectLst>
                     <a:outerShdw dist="35921" dir="2700000" algn="ctr" rotWithShape="0">
                       <a:schemeClr val="bg2"/>
@@ -8039,12 +8039,12 @@
             <a:effectLst/>
             <a:extLst>
               <a:ext uri="{909E8E84-426E-40dd-AFC4-6F175D3DCCD1}">
-                <a14:hiddenFill xmlns:a14="http://schemas.microsoft.com/office/drawing/2010/main" xmlns="">
+                <a14:hiddenFill xmlns="" xmlns:a14="http://schemas.microsoft.com/office/drawing/2010/main">
                   <a:noFill/>
                 </a14:hiddenFill>
               </a:ext>
               <a:ext uri="{AF507438-7753-43e0-B8FC-AC1667EBCBE1}">
-                <a14:hiddenEffects xmlns:a14="http://schemas.microsoft.com/office/drawing/2010/main" xmlns="">
+                <a14:hiddenEffects xmlns="" xmlns:a14="http://schemas.microsoft.com/office/drawing/2010/main">
                   <a:effectLst>
                     <a:outerShdw dist="35921" dir="2700000" algn="ctr" rotWithShape="0">
                       <a:schemeClr val="bg2"/>
@@ -8090,12 +8090,12 @@
             <a:effectLst/>
             <a:extLst>
               <a:ext uri="{909E8E84-426E-40dd-AFC4-6F175D3DCCD1}">
-                <a14:hiddenFill xmlns:a14="http://schemas.microsoft.com/office/drawing/2010/main" xmlns="">
+                <a14:hiddenFill xmlns="" xmlns:a14="http://schemas.microsoft.com/office/drawing/2010/main">
                   <a:noFill/>
                 </a14:hiddenFill>
               </a:ext>
               <a:ext uri="{AF507438-7753-43e0-B8FC-AC1667EBCBE1}">
-                <a14:hiddenEffects xmlns:a14="http://schemas.microsoft.com/office/drawing/2010/main" xmlns="">
+                <a14:hiddenEffects xmlns="" xmlns:a14="http://schemas.microsoft.com/office/drawing/2010/main">
                   <a:effectLst>
                     <a:outerShdw dist="35921" dir="2700000" algn="ctr" rotWithShape="0">
                       <a:schemeClr val="bg2"/>
@@ -8141,12 +8141,12 @@
             <a:effectLst/>
             <a:extLst>
               <a:ext uri="{909E8E84-426E-40dd-AFC4-6F175D3DCCD1}">
-                <a14:hiddenFill xmlns:a14="http://schemas.microsoft.com/office/drawing/2010/main" xmlns="">
+                <a14:hiddenFill xmlns="" xmlns:a14="http://schemas.microsoft.com/office/drawing/2010/main">
                   <a:noFill/>
                 </a14:hiddenFill>
               </a:ext>
               <a:ext uri="{AF507438-7753-43e0-B8FC-AC1667EBCBE1}">
-                <a14:hiddenEffects xmlns:a14="http://schemas.microsoft.com/office/drawing/2010/main" xmlns="">
+                <a14:hiddenEffects xmlns="" xmlns:a14="http://schemas.microsoft.com/office/drawing/2010/main">
                   <a:effectLst>
                     <a:outerShdw dist="35921" dir="2700000" algn="ctr" rotWithShape="0">
                       <a:schemeClr val="bg2"/>
@@ -8192,12 +8192,12 @@
             <a:effectLst/>
             <a:extLst>
               <a:ext uri="{909E8E84-426E-40dd-AFC4-6F175D3DCCD1}">
-                <a14:hiddenFill xmlns:a14="http://schemas.microsoft.com/office/drawing/2010/main" xmlns="">
+                <a14:hiddenFill xmlns="" xmlns:a14="http://schemas.microsoft.com/office/drawing/2010/main">
                   <a:noFill/>
                 </a14:hiddenFill>
               </a:ext>
               <a:ext uri="{AF507438-7753-43e0-B8FC-AC1667EBCBE1}">
-                <a14:hiddenEffects xmlns:a14="http://schemas.microsoft.com/office/drawing/2010/main" xmlns="">
+                <a14:hiddenEffects xmlns="" xmlns:a14="http://schemas.microsoft.com/office/drawing/2010/main">
                   <a:effectLst>
                     <a:outerShdw dist="35921" dir="2700000" algn="ctr" rotWithShape="0">
                       <a:schemeClr val="bg2"/>
@@ -8259,12 +8259,12 @@
               <a:effectLst/>
               <a:extLst>
                 <a:ext uri="{909E8E84-426E-40dd-AFC4-6F175D3DCCD1}">
-                  <a14:hiddenFill xmlns:a14="http://schemas.microsoft.com/office/drawing/2010/main" xmlns="">
+                  <a14:hiddenFill xmlns="" xmlns:a14="http://schemas.microsoft.com/office/drawing/2010/main">
                     <a:noFill/>
                   </a14:hiddenFill>
                 </a:ext>
                 <a:ext uri="{AF507438-7753-43e0-B8FC-AC1667EBCBE1}">
-                  <a14:hiddenEffects xmlns:a14="http://schemas.microsoft.com/office/drawing/2010/main" xmlns="">
+                  <a14:hiddenEffects xmlns="" xmlns:a14="http://schemas.microsoft.com/office/drawing/2010/main">
                     <a:effectLst>
                       <a:outerShdw dist="35921" dir="2700000" algn="ctr" rotWithShape="0">
                         <a:schemeClr val="bg2"/>
@@ -8310,12 +8310,12 @@
               <a:effectLst/>
               <a:extLst>
                 <a:ext uri="{909E8E84-426E-40dd-AFC4-6F175D3DCCD1}">
-                  <a14:hiddenFill xmlns:a14="http://schemas.microsoft.com/office/drawing/2010/main" xmlns="">
+                  <a14:hiddenFill xmlns="" xmlns:a14="http://schemas.microsoft.com/office/drawing/2010/main">
                     <a:noFill/>
                   </a14:hiddenFill>
                 </a:ext>
                 <a:ext uri="{AF507438-7753-43e0-B8FC-AC1667EBCBE1}">
-                  <a14:hiddenEffects xmlns:a14="http://schemas.microsoft.com/office/drawing/2010/main" xmlns="">
+                  <a14:hiddenEffects xmlns="" xmlns:a14="http://schemas.microsoft.com/office/drawing/2010/main">
                     <a:effectLst>
                       <a:outerShdw dist="35921" dir="2700000" algn="ctr" rotWithShape="0">
                         <a:schemeClr val="bg2"/>
@@ -8361,12 +8361,12 @@
               <a:effectLst/>
               <a:extLst>
                 <a:ext uri="{909E8E84-426E-40dd-AFC4-6F175D3DCCD1}">
-                  <a14:hiddenFill xmlns:a14="http://schemas.microsoft.com/office/drawing/2010/main" xmlns="">
+                  <a14:hiddenFill xmlns="" xmlns:a14="http://schemas.microsoft.com/office/drawing/2010/main">
                     <a:noFill/>
                   </a14:hiddenFill>
                 </a:ext>
                 <a:ext uri="{AF507438-7753-43e0-B8FC-AC1667EBCBE1}">
-                  <a14:hiddenEffects xmlns:a14="http://schemas.microsoft.com/office/drawing/2010/main" xmlns="">
+                  <a14:hiddenEffects xmlns="" xmlns:a14="http://schemas.microsoft.com/office/drawing/2010/main">
                     <a:effectLst>
                       <a:outerShdw dist="35921" dir="2700000" algn="ctr" rotWithShape="0">
                         <a:schemeClr val="bg2"/>
@@ -8412,12 +8412,12 @@
               <a:effectLst/>
               <a:extLst>
                 <a:ext uri="{909E8E84-426E-40dd-AFC4-6F175D3DCCD1}">
-                  <a14:hiddenFill xmlns:a14="http://schemas.microsoft.com/office/drawing/2010/main" xmlns="">
+                  <a14:hiddenFill xmlns="" xmlns:a14="http://schemas.microsoft.com/office/drawing/2010/main">
                     <a:noFill/>
                   </a14:hiddenFill>
                 </a:ext>
                 <a:ext uri="{AF507438-7753-43e0-B8FC-AC1667EBCBE1}">
-                  <a14:hiddenEffects xmlns:a14="http://schemas.microsoft.com/office/drawing/2010/main" xmlns="">
+                  <a14:hiddenEffects xmlns="" xmlns:a14="http://schemas.microsoft.com/office/drawing/2010/main">
                     <a:effectLst>
                       <a:outerShdw dist="35921" dir="2700000" algn="ctr" rotWithShape="0">
                         <a:schemeClr val="bg2"/>
@@ -8480,12 +8480,12 @@
               <a:effectLst/>
               <a:extLst>
                 <a:ext uri="{909E8E84-426E-40dd-AFC4-6F175D3DCCD1}">
-                  <a14:hiddenFill xmlns:a14="http://schemas.microsoft.com/office/drawing/2010/main" xmlns="">
+                  <a14:hiddenFill xmlns="" xmlns:a14="http://schemas.microsoft.com/office/drawing/2010/main">
                     <a:noFill/>
                   </a14:hiddenFill>
                 </a:ext>
                 <a:ext uri="{AF507438-7753-43e0-B8FC-AC1667EBCBE1}">
-                  <a14:hiddenEffects xmlns:a14="http://schemas.microsoft.com/office/drawing/2010/main" xmlns="">
+                  <a14:hiddenEffects xmlns="" xmlns:a14="http://schemas.microsoft.com/office/drawing/2010/main">
                     <a:effectLst>
                       <a:outerShdw dist="35921" dir="2700000" algn="ctr" rotWithShape="0">
                         <a:schemeClr val="bg2"/>
@@ -8531,12 +8531,12 @@
               <a:effectLst/>
               <a:extLst>
                 <a:ext uri="{909E8E84-426E-40dd-AFC4-6F175D3DCCD1}">
-                  <a14:hiddenFill xmlns:a14="http://schemas.microsoft.com/office/drawing/2010/main" xmlns="">
+                  <a14:hiddenFill xmlns="" xmlns:a14="http://schemas.microsoft.com/office/drawing/2010/main">
                     <a:noFill/>
                   </a14:hiddenFill>
                 </a:ext>
                 <a:ext uri="{AF507438-7753-43e0-B8FC-AC1667EBCBE1}">
-                  <a14:hiddenEffects xmlns:a14="http://schemas.microsoft.com/office/drawing/2010/main" xmlns="">
+                  <a14:hiddenEffects xmlns="" xmlns:a14="http://schemas.microsoft.com/office/drawing/2010/main">
                     <a:effectLst>
                       <a:outerShdw dist="35921" dir="2700000" algn="ctr" rotWithShape="0">
                         <a:schemeClr val="bg2"/>
@@ -8582,12 +8582,12 @@
               <a:effectLst/>
               <a:extLst>
                 <a:ext uri="{909E8E84-426E-40dd-AFC4-6F175D3DCCD1}">
-                  <a14:hiddenFill xmlns:a14="http://schemas.microsoft.com/office/drawing/2010/main" xmlns="">
+                  <a14:hiddenFill xmlns="" xmlns:a14="http://schemas.microsoft.com/office/drawing/2010/main">
                     <a:noFill/>
                   </a14:hiddenFill>
                 </a:ext>
                 <a:ext uri="{AF507438-7753-43e0-B8FC-AC1667EBCBE1}">
-                  <a14:hiddenEffects xmlns:a14="http://schemas.microsoft.com/office/drawing/2010/main" xmlns="">
+                  <a14:hiddenEffects xmlns="" xmlns:a14="http://schemas.microsoft.com/office/drawing/2010/main">
                     <a:effectLst>
                       <a:outerShdw dist="35921" dir="2700000" algn="ctr" rotWithShape="0">
                         <a:schemeClr val="bg2"/>
@@ -8633,12 +8633,12 @@
               <a:effectLst/>
               <a:extLst>
                 <a:ext uri="{909E8E84-426E-40dd-AFC4-6F175D3DCCD1}">
-                  <a14:hiddenFill xmlns:a14="http://schemas.microsoft.com/office/drawing/2010/main" xmlns="">
+                  <a14:hiddenFill xmlns="" xmlns:a14="http://schemas.microsoft.com/office/drawing/2010/main">
                     <a:noFill/>
                   </a14:hiddenFill>
                 </a:ext>
                 <a:ext uri="{AF507438-7753-43e0-B8FC-AC1667EBCBE1}">
-                  <a14:hiddenEffects xmlns:a14="http://schemas.microsoft.com/office/drawing/2010/main" xmlns="">
+                  <a14:hiddenEffects xmlns="" xmlns:a14="http://schemas.microsoft.com/office/drawing/2010/main">
                     <a:effectLst>
                       <a:outerShdw dist="35921" dir="2700000" algn="ctr" rotWithShape="0">
                         <a:schemeClr val="bg2"/>
@@ -8685,12 +8685,12 @@
             <a:effectLst/>
             <a:extLst>
               <a:ext uri="{909E8E84-426E-40dd-AFC4-6F175D3DCCD1}">
-                <a14:hiddenFill xmlns:a14="http://schemas.microsoft.com/office/drawing/2010/main" xmlns="">
+                <a14:hiddenFill xmlns="" xmlns:a14="http://schemas.microsoft.com/office/drawing/2010/main">
                   <a:noFill/>
                 </a14:hiddenFill>
               </a:ext>
               <a:ext uri="{AF507438-7753-43e0-B8FC-AC1667EBCBE1}">
-                <a14:hiddenEffects xmlns:a14="http://schemas.microsoft.com/office/drawing/2010/main" xmlns="">
+                <a14:hiddenEffects xmlns="" xmlns:a14="http://schemas.microsoft.com/office/drawing/2010/main">
                   <a:effectLst>
                     <a:outerShdw dist="35921" dir="2700000" algn="ctr" rotWithShape="0">
                       <a:schemeClr val="bg2"/>
@@ -8736,12 +8736,12 @@
             <a:effectLst/>
             <a:extLst>
               <a:ext uri="{909E8E84-426E-40dd-AFC4-6F175D3DCCD1}">
-                <a14:hiddenFill xmlns:a14="http://schemas.microsoft.com/office/drawing/2010/main" xmlns="">
+                <a14:hiddenFill xmlns="" xmlns:a14="http://schemas.microsoft.com/office/drawing/2010/main">
                   <a:noFill/>
                 </a14:hiddenFill>
               </a:ext>
               <a:ext uri="{AF507438-7753-43e0-B8FC-AC1667EBCBE1}">
-                <a14:hiddenEffects xmlns:a14="http://schemas.microsoft.com/office/drawing/2010/main" xmlns="">
+                <a14:hiddenEffects xmlns="" xmlns:a14="http://schemas.microsoft.com/office/drawing/2010/main">
                   <a:effectLst>
                     <a:outerShdw dist="35921" dir="2700000" algn="ctr" rotWithShape="0">
                       <a:schemeClr val="bg2"/>
@@ -8853,14 +8853,14 @@
               <a:effectLst/>
               <a:extLst>
                 <a:ext uri="{909E8E84-426E-40dd-AFC4-6F175D3DCCD1}">
-                  <a14:hiddenFill xmlns:a14="http://schemas.microsoft.com/office/drawing/2010/main" xmlns="">
+                  <a14:hiddenFill xmlns="" xmlns:a14="http://schemas.microsoft.com/office/drawing/2010/main">
                     <a:solidFill>
                       <a:srgbClr val="FFFF00"/>
                     </a:solidFill>
                   </a14:hiddenFill>
                 </a:ext>
                 <a:ext uri="{AF507438-7753-43e0-B8FC-AC1667EBCBE1}">
-                  <a14:hiddenEffects xmlns:a14="http://schemas.microsoft.com/office/drawing/2010/main" xmlns="">
+                  <a14:hiddenEffects xmlns="" xmlns:a14="http://schemas.microsoft.com/office/drawing/2010/main">
                     <a:effectLst>
                       <a:outerShdw dist="35921" dir="2700000" algn="ctr" rotWithShape="0">
                         <a:schemeClr val="bg2"/>
@@ -8956,14 +8956,14 @@
               <a:effectLst/>
               <a:extLst>
                 <a:ext uri="{909E8E84-426E-40dd-AFC4-6F175D3DCCD1}">
-                  <a14:hiddenFill xmlns:a14="http://schemas.microsoft.com/office/drawing/2010/main" xmlns="">
+                  <a14:hiddenFill xmlns="" xmlns:a14="http://schemas.microsoft.com/office/drawing/2010/main">
                     <a:solidFill>
                       <a:srgbClr val="FFFF00"/>
                     </a:solidFill>
                   </a14:hiddenFill>
                 </a:ext>
                 <a:ext uri="{AF507438-7753-43e0-B8FC-AC1667EBCBE1}">
-                  <a14:hiddenEffects xmlns:a14="http://schemas.microsoft.com/office/drawing/2010/main" xmlns="">
+                  <a14:hiddenEffects xmlns="" xmlns:a14="http://schemas.microsoft.com/office/drawing/2010/main">
                     <a:effectLst>
                       <a:outerShdw dist="35921" dir="2700000" algn="ctr" rotWithShape="0">
                         <a:schemeClr val="bg2"/>
@@ -9010,12 +9010,12 @@
             <a:effectLst/>
             <a:extLst>
               <a:ext uri="{909E8E84-426E-40dd-AFC4-6F175D3DCCD1}">
-                <a14:hiddenFill xmlns:a14="http://schemas.microsoft.com/office/drawing/2010/main" xmlns="">
+                <a14:hiddenFill xmlns="" xmlns:a14="http://schemas.microsoft.com/office/drawing/2010/main">
                   <a:noFill/>
                 </a14:hiddenFill>
               </a:ext>
               <a:ext uri="{AF507438-7753-43e0-B8FC-AC1667EBCBE1}">
-                <a14:hiddenEffects xmlns:a14="http://schemas.microsoft.com/office/drawing/2010/main" xmlns="">
+                <a14:hiddenEffects xmlns="" xmlns:a14="http://schemas.microsoft.com/office/drawing/2010/main">
                   <a:effectLst>
                     <a:outerShdw dist="35921" dir="2700000" algn="ctr" rotWithShape="0">
                       <a:schemeClr val="bg2"/>
@@ -9061,12 +9061,12 @@
             <a:effectLst/>
             <a:extLst>
               <a:ext uri="{909E8E84-426E-40dd-AFC4-6F175D3DCCD1}">
-                <a14:hiddenFill xmlns:a14="http://schemas.microsoft.com/office/drawing/2010/main" xmlns="">
+                <a14:hiddenFill xmlns="" xmlns:a14="http://schemas.microsoft.com/office/drawing/2010/main">
                   <a:noFill/>
                 </a14:hiddenFill>
               </a:ext>
               <a:ext uri="{AF507438-7753-43e0-B8FC-AC1667EBCBE1}">
-                <a14:hiddenEffects xmlns:a14="http://schemas.microsoft.com/office/drawing/2010/main" xmlns="">
+                <a14:hiddenEffects xmlns="" xmlns:a14="http://schemas.microsoft.com/office/drawing/2010/main">
                   <a:effectLst>
                     <a:outerShdw dist="35921" dir="2700000" algn="ctr" rotWithShape="0">
                       <a:schemeClr val="bg2"/>
@@ -9112,12 +9112,12 @@
             <a:effectLst/>
             <a:extLst>
               <a:ext uri="{909E8E84-426E-40dd-AFC4-6F175D3DCCD1}">
-                <a14:hiddenFill xmlns:a14="http://schemas.microsoft.com/office/drawing/2010/main" xmlns="">
+                <a14:hiddenFill xmlns="" xmlns:a14="http://schemas.microsoft.com/office/drawing/2010/main">
                   <a:noFill/>
                 </a14:hiddenFill>
               </a:ext>
               <a:ext uri="{AF507438-7753-43e0-B8FC-AC1667EBCBE1}">
-                <a14:hiddenEffects xmlns:a14="http://schemas.microsoft.com/office/drawing/2010/main" xmlns="">
+                <a14:hiddenEffects xmlns="" xmlns:a14="http://schemas.microsoft.com/office/drawing/2010/main">
                   <a:effectLst>
                     <a:outerShdw dist="35921" dir="2700000" algn="ctr" rotWithShape="0">
                       <a:schemeClr val="bg2"/>
@@ -9163,12 +9163,12 @@
             <a:effectLst/>
             <a:extLst>
               <a:ext uri="{909E8E84-426E-40dd-AFC4-6F175D3DCCD1}">
-                <a14:hiddenFill xmlns:a14="http://schemas.microsoft.com/office/drawing/2010/main" xmlns="">
+                <a14:hiddenFill xmlns="" xmlns:a14="http://schemas.microsoft.com/office/drawing/2010/main">
                   <a:noFill/>
                 </a14:hiddenFill>
               </a:ext>
               <a:ext uri="{AF507438-7753-43e0-B8FC-AC1667EBCBE1}">
-                <a14:hiddenEffects xmlns:a14="http://schemas.microsoft.com/office/drawing/2010/main" xmlns="">
+                <a14:hiddenEffects xmlns="" xmlns:a14="http://schemas.microsoft.com/office/drawing/2010/main">
                   <a:effectLst>
                     <a:outerShdw dist="35921" dir="2700000" algn="ctr" rotWithShape="0">
                       <a:schemeClr val="bg2"/>
@@ -9214,12 +9214,12 @@
             <a:effectLst/>
             <a:extLst>
               <a:ext uri="{909E8E84-426E-40dd-AFC4-6F175D3DCCD1}">
-                <a14:hiddenFill xmlns:a14="http://schemas.microsoft.com/office/drawing/2010/main" xmlns="">
+                <a14:hiddenFill xmlns="" xmlns:a14="http://schemas.microsoft.com/office/drawing/2010/main">
                   <a:noFill/>
                 </a14:hiddenFill>
               </a:ext>
               <a:ext uri="{AF507438-7753-43e0-B8FC-AC1667EBCBE1}">
-                <a14:hiddenEffects xmlns:a14="http://schemas.microsoft.com/office/drawing/2010/main" xmlns="">
+                <a14:hiddenEffects xmlns="" xmlns:a14="http://schemas.microsoft.com/office/drawing/2010/main">
                   <a:effectLst>
                     <a:outerShdw dist="35921" dir="2700000" algn="ctr" rotWithShape="0">
                       <a:schemeClr val="bg2"/>
@@ -9265,12 +9265,12 @@
             <a:effectLst/>
             <a:extLst>
               <a:ext uri="{909E8E84-426E-40dd-AFC4-6F175D3DCCD1}">
-                <a14:hiddenFill xmlns:a14="http://schemas.microsoft.com/office/drawing/2010/main" xmlns="">
+                <a14:hiddenFill xmlns="" xmlns:a14="http://schemas.microsoft.com/office/drawing/2010/main">
                   <a:noFill/>
                 </a14:hiddenFill>
               </a:ext>
               <a:ext uri="{AF507438-7753-43e0-B8FC-AC1667EBCBE1}">
-                <a14:hiddenEffects xmlns:a14="http://schemas.microsoft.com/office/drawing/2010/main" xmlns="">
+                <a14:hiddenEffects xmlns="" xmlns:a14="http://schemas.microsoft.com/office/drawing/2010/main">
                   <a:effectLst>
                     <a:outerShdw dist="35921" dir="2700000" algn="ctr" rotWithShape="0">
                       <a:schemeClr val="bg2"/>
@@ -9382,14 +9382,14 @@
               <a:effectLst/>
               <a:extLst>
                 <a:ext uri="{909E8E84-426E-40dd-AFC4-6F175D3DCCD1}">
-                  <a14:hiddenFill xmlns:a14="http://schemas.microsoft.com/office/drawing/2010/main" xmlns="">
+                  <a14:hiddenFill xmlns="" xmlns:a14="http://schemas.microsoft.com/office/drawing/2010/main">
                     <a:solidFill>
                       <a:srgbClr val="FFFF00"/>
                     </a:solidFill>
                   </a14:hiddenFill>
                 </a:ext>
                 <a:ext uri="{AF507438-7753-43e0-B8FC-AC1667EBCBE1}">
-                  <a14:hiddenEffects xmlns:a14="http://schemas.microsoft.com/office/drawing/2010/main" xmlns="">
+                  <a14:hiddenEffects xmlns="" xmlns:a14="http://schemas.microsoft.com/office/drawing/2010/main">
                     <a:effectLst>
                       <a:outerShdw dist="35921" dir="2700000" algn="ctr" rotWithShape="0">
                         <a:schemeClr val="bg2"/>
@@ -9485,14 +9485,14 @@
               <a:effectLst/>
               <a:extLst>
                 <a:ext uri="{909E8E84-426E-40dd-AFC4-6F175D3DCCD1}">
-                  <a14:hiddenFill xmlns:a14="http://schemas.microsoft.com/office/drawing/2010/main" xmlns="">
+                  <a14:hiddenFill xmlns="" xmlns:a14="http://schemas.microsoft.com/office/drawing/2010/main">
                     <a:solidFill>
                       <a:srgbClr val="FFFF00"/>
                     </a:solidFill>
                   </a14:hiddenFill>
                 </a:ext>
                 <a:ext uri="{AF507438-7753-43e0-B8FC-AC1667EBCBE1}">
-                  <a14:hiddenEffects xmlns:a14="http://schemas.microsoft.com/office/drawing/2010/main" xmlns="">
+                  <a14:hiddenEffects xmlns="" xmlns:a14="http://schemas.microsoft.com/office/drawing/2010/main">
                     <a:effectLst>
                       <a:outerShdw dist="35921" dir="2700000" algn="ctr" rotWithShape="0">
                         <a:schemeClr val="bg2"/>
@@ -9539,12 +9539,12 @@
             <a:effectLst/>
             <a:extLst>
               <a:ext uri="{909E8E84-426E-40dd-AFC4-6F175D3DCCD1}">
-                <a14:hiddenFill xmlns:a14="http://schemas.microsoft.com/office/drawing/2010/main" xmlns="">
+                <a14:hiddenFill xmlns="" xmlns:a14="http://schemas.microsoft.com/office/drawing/2010/main">
                   <a:noFill/>
                 </a14:hiddenFill>
               </a:ext>
               <a:ext uri="{AF507438-7753-43e0-B8FC-AC1667EBCBE1}">
-                <a14:hiddenEffects xmlns:a14="http://schemas.microsoft.com/office/drawing/2010/main" xmlns="">
+                <a14:hiddenEffects xmlns="" xmlns:a14="http://schemas.microsoft.com/office/drawing/2010/main">
                   <a:effectLst>
                     <a:outerShdw dist="35921" dir="2700000" algn="ctr" rotWithShape="0">
                       <a:schemeClr val="bg2"/>
@@ -9656,14 +9656,14 @@
               <a:effectLst/>
               <a:extLst>
                 <a:ext uri="{909E8E84-426E-40dd-AFC4-6F175D3DCCD1}">
-                  <a14:hiddenFill xmlns:a14="http://schemas.microsoft.com/office/drawing/2010/main" xmlns="">
+                  <a14:hiddenFill xmlns="" xmlns:a14="http://schemas.microsoft.com/office/drawing/2010/main">
                     <a:solidFill>
                       <a:srgbClr val="FFFF00"/>
                     </a:solidFill>
                   </a14:hiddenFill>
                 </a:ext>
                 <a:ext uri="{AF507438-7753-43e0-B8FC-AC1667EBCBE1}">
-                  <a14:hiddenEffects xmlns:a14="http://schemas.microsoft.com/office/drawing/2010/main" xmlns="">
+                  <a14:hiddenEffects xmlns="" xmlns:a14="http://schemas.microsoft.com/office/drawing/2010/main">
                     <a:effectLst>
                       <a:outerShdw dist="35921" dir="2700000" algn="ctr" rotWithShape="0">
                         <a:schemeClr val="bg2"/>
@@ -9759,14 +9759,14 @@
               <a:effectLst/>
               <a:extLst>
                 <a:ext uri="{909E8E84-426E-40dd-AFC4-6F175D3DCCD1}">
-                  <a14:hiddenFill xmlns:a14="http://schemas.microsoft.com/office/drawing/2010/main" xmlns="">
+                  <a14:hiddenFill xmlns="" xmlns:a14="http://schemas.microsoft.com/office/drawing/2010/main">
                     <a:solidFill>
                       <a:srgbClr val="FFFF00"/>
                     </a:solidFill>
                   </a14:hiddenFill>
                 </a:ext>
                 <a:ext uri="{AF507438-7753-43e0-B8FC-AC1667EBCBE1}">
-                  <a14:hiddenEffects xmlns:a14="http://schemas.microsoft.com/office/drawing/2010/main" xmlns="">
+                  <a14:hiddenEffects xmlns="" xmlns:a14="http://schemas.microsoft.com/office/drawing/2010/main">
                     <a:effectLst>
                       <a:outerShdw dist="35921" dir="2700000" algn="ctr" rotWithShape="0">
                         <a:schemeClr val="bg2"/>
@@ -11183,14 +11183,14 @@
           <a:effectLst/>
           <a:extLst>
             <a:ext uri="{909E8E84-426E-40dd-AFC4-6F175D3DCCD1}">
-              <a14:hiddenFill xmlns:a14="http://schemas.microsoft.com/office/drawing/2010/main" xmlns="">
+              <a14:hiddenFill xmlns="" xmlns:a14="http://schemas.microsoft.com/office/drawing/2010/main">
                 <a:solidFill>
                   <a:schemeClr val="accent1"/>
                 </a:solidFill>
               </a14:hiddenFill>
             </a:ext>
             <a:ext uri="{91240B29-F687-4f45-9708-019B960494DF}">
-              <a14:hiddenLine xmlns:a14="http://schemas.microsoft.com/office/drawing/2010/main" xmlns="" w="9525">
+              <a14:hiddenLine xmlns="" xmlns:a14="http://schemas.microsoft.com/office/drawing/2010/main" w="9525">
                 <a:solidFill>
                   <a:schemeClr val="tx1"/>
                 </a:solidFill>
@@ -11200,7 +11200,7 @@
               </a14:hiddenLine>
             </a:ext>
             <a:ext uri="{AF507438-7753-43e0-B8FC-AC1667EBCBE1}">
-              <a14:hiddenEffects xmlns:a14="http://schemas.microsoft.com/office/drawing/2010/main" xmlns="">
+              <a14:hiddenEffects xmlns="" xmlns:a14="http://schemas.microsoft.com/office/drawing/2010/main">
                 <a:effectLst>
                   <a:outerShdw dist="35921" dir="2700000" algn="ctr" rotWithShape="0">
                     <a:schemeClr val="bg2"/>

</xml_diff>